<commit_message>
#2 add code and refactor code for accommodating new design of w3.events
</commit_message>
<xml_diff>
--- a/design/designs.pptx
+++ b/design/designs.pptx
@@ -3634,7 +3634,7 @@
           <p:spPr>
             <a:xfrm>
               <a:off x="6262100" y="874213"/>
-              <a:ext cx="1264403" cy="640515"/>
+              <a:ext cx="1073646" cy="640515"/>
             </a:xfrm>
             <a:prstGeom prst="rect">
               <a:avLst/>
@@ -3662,7 +3662,7 @@
             <a:p>
               <a:r>
                 <a:rPr lang="en-US" altLang="zh-CN" dirty="0"/>
-                <a:t>Network</a:t>
+                <a:t>Swarm</a:t>
               </a:r>
               <a:endParaRPr lang="zh-CN" altLang="en-US" dirty="0"/>
             </a:p>
@@ -3683,7 +3683,7 @@
         </p:nvSpPr>
         <p:spPr>
           <a:xfrm>
-            <a:off x="873304" y="762977"/>
+            <a:off x="1416540" y="640515"/>
             <a:ext cx="9328933" cy="2308324"/>
           </a:xfrm>
           <a:prstGeom prst="rect">
@@ -4517,7 +4517,7 @@
           <p:spPr>
             <a:xfrm>
               <a:off x="6262100" y="874213"/>
-              <a:ext cx="1264403" cy="640515"/>
+              <a:ext cx="1073646" cy="640515"/>
             </a:xfrm>
             <a:prstGeom prst="rect">
               <a:avLst/>
@@ -4545,7 +4545,7 @@
             <a:p>
               <a:r>
                 <a:rPr lang="en-US" altLang="zh-CN" dirty="0"/>
-                <a:t>Network</a:t>
+                <a:t>Swarm</a:t>
               </a:r>
               <a:endParaRPr lang="zh-CN" altLang="en-US" dirty="0"/>
             </a:p>

</xml_diff>

<commit_message>
#8 design the illusion of Dashboard messages passing
</commit_message>
<xml_diff>
--- a/design/designs.pptx
+++ b/design/designs.pptx
@@ -8,8 +8,11 @@
     <p:sldId id="256" r:id="rId2"/>
     <p:sldId id="1346" r:id="rId3"/>
     <p:sldId id="1353" r:id="rId4"/>
-    <p:sldId id="1349" r:id="rId5"/>
-    <p:sldId id="1351" r:id="rId6"/>
+    <p:sldId id="257" r:id="rId5"/>
+    <p:sldId id="1349" r:id="rId6"/>
+    <p:sldId id="1351" r:id="rId7"/>
+    <p:sldId id="258" r:id="rId8"/>
+    <p:sldId id="259" r:id="rId9"/>
   </p:sldIdLst>
   <p:sldSz cx="12192000" cy="6858000"/>
   <p:notesSz cx="6858000" cy="9144000"/>
@@ -263,7 +266,7 @@
           <a:p>
             <a:fld id="{C5457D4C-3901-1C45-A529-D016DF44E2F2}" type="datetimeFigureOut">
               <a:rPr kumimoji="1" lang="zh-CN" altLang="en-US" smtClean="0"/>
-              <a:t>2022/9/4</a:t>
+              <a:t>2022/9/5</a:t>
             </a:fld>
             <a:endParaRPr kumimoji="1" lang="zh-CN" altLang="en-US"/>
           </a:p>
@@ -461,7 +464,7 @@
           <a:p>
             <a:fld id="{C5457D4C-3901-1C45-A529-D016DF44E2F2}" type="datetimeFigureOut">
               <a:rPr kumimoji="1" lang="zh-CN" altLang="en-US" smtClean="0"/>
-              <a:t>2022/9/4</a:t>
+              <a:t>2022/9/5</a:t>
             </a:fld>
             <a:endParaRPr kumimoji="1" lang="zh-CN" altLang="en-US"/>
           </a:p>
@@ -669,7 +672,7 @@
           <a:p>
             <a:fld id="{C5457D4C-3901-1C45-A529-D016DF44E2F2}" type="datetimeFigureOut">
               <a:rPr kumimoji="1" lang="zh-CN" altLang="en-US" smtClean="0"/>
-              <a:t>2022/9/4</a:t>
+              <a:t>2022/9/5</a:t>
             </a:fld>
             <a:endParaRPr kumimoji="1" lang="zh-CN" altLang="en-US"/>
           </a:p>
@@ -867,7 +870,7 @@
           <a:p>
             <a:fld id="{C5457D4C-3901-1C45-A529-D016DF44E2F2}" type="datetimeFigureOut">
               <a:rPr kumimoji="1" lang="zh-CN" altLang="en-US" smtClean="0"/>
-              <a:t>2022/9/4</a:t>
+              <a:t>2022/9/5</a:t>
             </a:fld>
             <a:endParaRPr kumimoji="1" lang="zh-CN" altLang="en-US"/>
           </a:p>
@@ -1142,7 +1145,7 @@
           <a:p>
             <a:fld id="{C5457D4C-3901-1C45-A529-D016DF44E2F2}" type="datetimeFigureOut">
               <a:rPr kumimoji="1" lang="zh-CN" altLang="en-US" smtClean="0"/>
-              <a:t>2022/9/4</a:t>
+              <a:t>2022/9/5</a:t>
             </a:fld>
             <a:endParaRPr kumimoji="1" lang="zh-CN" altLang="en-US"/>
           </a:p>
@@ -1407,7 +1410,7 @@
           <a:p>
             <a:fld id="{C5457D4C-3901-1C45-A529-D016DF44E2F2}" type="datetimeFigureOut">
               <a:rPr kumimoji="1" lang="zh-CN" altLang="en-US" smtClean="0"/>
-              <a:t>2022/9/4</a:t>
+              <a:t>2022/9/5</a:t>
             </a:fld>
             <a:endParaRPr kumimoji="1" lang="zh-CN" altLang="en-US"/>
           </a:p>
@@ -1819,7 +1822,7 @@
           <a:p>
             <a:fld id="{C5457D4C-3901-1C45-A529-D016DF44E2F2}" type="datetimeFigureOut">
               <a:rPr kumimoji="1" lang="zh-CN" altLang="en-US" smtClean="0"/>
-              <a:t>2022/9/4</a:t>
+              <a:t>2022/9/5</a:t>
             </a:fld>
             <a:endParaRPr kumimoji="1" lang="zh-CN" altLang="en-US"/>
           </a:p>
@@ -1960,7 +1963,7 @@
           <a:p>
             <a:fld id="{C5457D4C-3901-1C45-A529-D016DF44E2F2}" type="datetimeFigureOut">
               <a:rPr kumimoji="1" lang="zh-CN" altLang="en-US" smtClean="0"/>
-              <a:t>2022/9/4</a:t>
+              <a:t>2022/9/5</a:t>
             </a:fld>
             <a:endParaRPr kumimoji="1" lang="zh-CN" altLang="en-US"/>
           </a:p>
@@ -2073,7 +2076,7 @@
           <a:p>
             <a:fld id="{C5457D4C-3901-1C45-A529-D016DF44E2F2}" type="datetimeFigureOut">
               <a:rPr kumimoji="1" lang="zh-CN" altLang="en-US" smtClean="0"/>
-              <a:t>2022/9/4</a:t>
+              <a:t>2022/9/5</a:t>
             </a:fld>
             <a:endParaRPr kumimoji="1" lang="zh-CN" altLang="en-US"/>
           </a:p>
@@ -2384,7 +2387,7 @@
           <a:p>
             <a:fld id="{C5457D4C-3901-1C45-A529-D016DF44E2F2}" type="datetimeFigureOut">
               <a:rPr kumimoji="1" lang="zh-CN" altLang="en-US" smtClean="0"/>
-              <a:t>2022/9/4</a:t>
+              <a:t>2022/9/5</a:t>
             </a:fld>
             <a:endParaRPr kumimoji="1" lang="zh-CN" altLang="en-US"/>
           </a:p>
@@ -2672,7 +2675,7 @@
           <a:p>
             <a:fld id="{C5457D4C-3901-1C45-A529-D016DF44E2F2}" type="datetimeFigureOut">
               <a:rPr kumimoji="1" lang="zh-CN" altLang="en-US" smtClean="0"/>
-              <a:t>2022/9/4</a:t>
+              <a:t>2022/9/5</a:t>
             </a:fld>
             <a:endParaRPr kumimoji="1" lang="zh-CN" altLang="en-US"/>
           </a:p>
@@ -2913,7 +2916,7 @@
           <a:p>
             <a:fld id="{C5457D4C-3901-1C45-A529-D016DF44E2F2}" type="datetimeFigureOut">
               <a:rPr kumimoji="1" lang="zh-CN" altLang="en-US" smtClean="0"/>
-              <a:t>2022/9/4</a:t>
+              <a:t>2022/9/5</a:t>
             </a:fld>
             <a:endParaRPr kumimoji="1" lang="zh-CN" altLang="en-US"/>
           </a:p>
@@ -3634,7 +3637,7 @@
           <p:spPr>
             <a:xfrm>
               <a:off x="6262100" y="874213"/>
-              <a:ext cx="1073646" cy="640515"/>
+              <a:ext cx="1264403" cy="640515"/>
             </a:xfrm>
             <a:prstGeom prst="rect">
               <a:avLst/>
@@ -3662,7 +3665,7 @@
             <a:p>
               <a:r>
                 <a:rPr lang="en-US" altLang="zh-CN" dirty="0"/>
-                <a:t>Swarm</a:t>
+                <a:t>Network</a:t>
               </a:r>
               <a:endParaRPr lang="zh-CN" altLang="en-US" dirty="0"/>
             </a:p>
@@ -3683,7 +3686,7 @@
         </p:nvSpPr>
         <p:spPr>
           <a:xfrm>
-            <a:off x="1416540" y="640515"/>
+            <a:off x="873304" y="762977"/>
             <a:ext cx="9328933" cy="2308324"/>
           </a:xfrm>
           <a:prstGeom prst="rect">
@@ -4517,7 +4520,7 @@
           <p:spPr>
             <a:xfrm>
               <a:off x="6262100" y="874213"/>
-              <a:ext cx="1073646" cy="640515"/>
+              <a:ext cx="1264403" cy="640515"/>
             </a:xfrm>
             <a:prstGeom prst="rect">
               <a:avLst/>
@@ -4545,7 +4548,7 @@
             <a:p>
               <a:r>
                 <a:rPr lang="en-US" altLang="zh-CN" dirty="0"/>
-                <a:t>Swarm</a:t>
+                <a:t>Network</a:t>
               </a:r>
               <a:endParaRPr lang="zh-CN" altLang="en-US" dirty="0"/>
             </a:p>
@@ -5019,355 +5022,6 @@
           </a:p>
         </p:txBody>
       </p:sp>
-      <p:sp>
-        <p:nvSpPr>
-          <p:cNvPr id="14" name="文本框 13">
-            <a:extLst>
-              <a:ext uri="{FF2B5EF4-FFF2-40B4-BE49-F238E27FC236}">
-                <a16:creationId xmlns:a16="http://schemas.microsoft.com/office/drawing/2014/main" id="{DB510E1F-71A2-7D57-D8F7-CF743D7735FE}"/>
-              </a:ext>
-            </a:extLst>
-          </p:cNvPr>
-          <p:cNvSpPr txBox="1"/>
-          <p:nvPr/>
-        </p:nvSpPr>
-        <p:spPr>
-          <a:xfrm>
-            <a:off x="3294714" y="2318335"/>
-            <a:ext cx="7837402" cy="830997"/>
-          </a:xfrm>
-          <a:prstGeom prst="rect">
-            <a:avLst/>
-          </a:prstGeom>
-          <a:solidFill>
-            <a:schemeClr val="bg1"/>
-          </a:solidFill>
-        </p:spPr>
-        <p:txBody>
-          <a:bodyPr wrap="none" rtlCol="0">
-            <a:spAutoFit/>
-          </a:bodyPr>
-          <a:lstStyle/>
-          <a:p>
-            <a:pPr marL="342900" indent="-342900">
-              <a:buFont typeface="+mj-lt"/>
-              <a:buAutoNum type="arabicPeriod"/>
-            </a:pPr>
-            <a:r>
-              <a:rPr kumimoji="1" lang="zh-CN" altLang="en-US" sz="1600" dirty="0"/>
-              <a:t>消息传递（ </a:t>
-            </a:r>
-            <a:r>
-              <a:rPr kumimoji="1" lang="en-US" altLang="zh-CN" sz="1600" dirty="0" err="1"/>
-              <a:t>tx</a:t>
-            </a:r>
-            <a:r>
-              <a:rPr kumimoji="1" lang="en-US" altLang="zh-CN" sz="1600" dirty="0"/>
-              <a:t>,</a:t>
-            </a:r>
-            <a:r>
-              <a:rPr kumimoji="1" lang="zh-CN" altLang="en-US" sz="1600" dirty="0"/>
-              <a:t> </a:t>
-            </a:r>
-            <a:r>
-              <a:rPr kumimoji="1" lang="en-US" altLang="zh-CN" sz="1600" dirty="0"/>
-              <a:t>bp,</a:t>
-            </a:r>
-            <a:r>
-              <a:rPr kumimoji="1" lang="zh-CN" altLang="en-US" sz="1600" dirty="0"/>
-              <a:t> </a:t>
-            </a:r>
-            <a:r>
-              <a:rPr kumimoji="1" lang="en-US" altLang="zh-CN" sz="1600" dirty="0"/>
-              <a:t>block,</a:t>
-            </a:r>
-            <a:r>
-              <a:rPr kumimoji="1" lang="zh-CN" altLang="en-US" sz="1600" dirty="0"/>
-              <a:t> </a:t>
-            </a:r>
-            <a:r>
-              <a:rPr kumimoji="1" lang="en-US" altLang="zh-CN" sz="1600" dirty="0">
-                <a:solidFill>
-                  <a:schemeClr val="bg1">
-                    <a:lumMod val="75000"/>
-                  </a:schemeClr>
-                </a:solidFill>
-              </a:rPr>
-              <a:t>fork</a:t>
-            </a:r>
-            <a:r>
-              <a:rPr kumimoji="1" lang="zh-CN" altLang="en-US" sz="1600" dirty="0"/>
-              <a:t>）：</a:t>
-            </a:r>
-            <a:r>
-              <a:rPr kumimoji="1" lang="en-US" altLang="zh-CN" sz="1600" dirty="0"/>
-              <a:t>from</a:t>
-            </a:r>
-            <a:r>
-              <a:rPr kumimoji="1" lang="zh-CN" altLang="en-US" sz="1600" dirty="0"/>
-              <a:t>亮， </a:t>
-            </a:r>
-            <a:r>
-              <a:rPr kumimoji="1" lang="en-US" altLang="zh-CN" sz="1600" dirty="0"/>
-              <a:t>--</a:t>
-            </a:r>
-            <a:r>
-              <a:rPr kumimoji="1" lang="zh-CN" altLang="en-US" sz="1600" dirty="0"/>
-              <a:t>画线（线头：</a:t>
-            </a:r>
-            <a:r>
-              <a:rPr kumimoji="1" lang="en-US" altLang="zh-CN" sz="1600" dirty="0" err="1"/>
-              <a:t>tx</a:t>
-            </a:r>
-            <a:r>
-              <a:rPr kumimoji="1" lang="en-US" altLang="zh-CN" sz="1600" dirty="0"/>
-              <a:t>/…</a:t>
-            </a:r>
-            <a:r>
-              <a:rPr kumimoji="1" lang="zh-CN" altLang="en-US" sz="1600" dirty="0"/>
-              <a:t>）</a:t>
-            </a:r>
-            <a:r>
-              <a:rPr kumimoji="1" lang="en-US" altLang="zh-CN" sz="1600" dirty="0"/>
-              <a:t>--&gt;</a:t>
-            </a:r>
-            <a:r>
-              <a:rPr kumimoji="1" lang="zh-CN" altLang="en-US" sz="1600" dirty="0"/>
-              <a:t> ，  </a:t>
-            </a:r>
-            <a:r>
-              <a:rPr kumimoji="1" lang="en-US" altLang="zh-CN" sz="1600" dirty="0"/>
-              <a:t>to</a:t>
-            </a:r>
-            <a:r>
-              <a:rPr kumimoji="1" lang="zh-CN" altLang="en-US" sz="1600" dirty="0"/>
-              <a:t>亮</a:t>
-            </a:r>
-            <a:endParaRPr kumimoji="1" lang="en-US" altLang="zh-CN" sz="1600" dirty="0"/>
-          </a:p>
-          <a:p>
-            <a:pPr marL="342900" indent="-342900">
-              <a:buFont typeface="+mj-lt"/>
-              <a:buAutoNum type="arabicPeriod"/>
-            </a:pPr>
-            <a:r>
-              <a:rPr kumimoji="1" lang="zh-CN" altLang="en-US" sz="1600" dirty="0"/>
-              <a:t>消息处理：</a:t>
-            </a:r>
-            <a:r>
-              <a:rPr kumimoji="1" lang="en-US" altLang="zh-CN" sz="1600" dirty="0" err="1"/>
-              <a:t>verifyTx</a:t>
-            </a:r>
-            <a:r>
-              <a:rPr kumimoji="1" lang="en-US" altLang="zh-CN" sz="1600" dirty="0"/>
-              <a:t>,</a:t>
-            </a:r>
-            <a:r>
-              <a:rPr kumimoji="1" lang="zh-CN" altLang="en-US" sz="1600" dirty="0"/>
-              <a:t> </a:t>
-            </a:r>
-            <a:r>
-              <a:rPr kumimoji="1" lang="en-US" altLang="zh-CN" sz="1600" dirty="0" err="1"/>
-              <a:t>vBp</a:t>
-            </a:r>
-            <a:r>
-              <a:rPr kumimoji="1" lang="en-US" altLang="zh-CN" sz="1600" dirty="0"/>
-              <a:t>,</a:t>
-            </a:r>
-            <a:r>
-              <a:rPr kumimoji="1" lang="zh-CN" altLang="en-US" sz="1600" dirty="0"/>
-              <a:t> </a:t>
-            </a:r>
-            <a:r>
-              <a:rPr kumimoji="1" lang="en-US" altLang="zh-CN" sz="1600" dirty="0" err="1"/>
-              <a:t>vBlock</a:t>
-            </a:r>
-            <a:r>
-              <a:rPr kumimoji="1" lang="zh-CN" altLang="en-US" sz="1600" dirty="0"/>
-              <a:t>结果，</a:t>
-            </a:r>
-            <a:r>
-              <a:rPr kumimoji="1" lang="en-US" altLang="zh-CN" sz="1600" dirty="0" err="1"/>
-              <a:t>addBlock</a:t>
-            </a:r>
-            <a:r>
-              <a:rPr kumimoji="1" lang="en-US" altLang="zh-CN" sz="1600" dirty="0"/>
-              <a:t>,</a:t>
-            </a:r>
-            <a:r>
-              <a:rPr kumimoji="1" lang="zh-CN" altLang="en-US" sz="1600" dirty="0"/>
-              <a:t> </a:t>
-            </a:r>
-            <a:r>
-              <a:rPr kumimoji="1" lang="en-US" altLang="zh-CN" sz="1600" dirty="0" err="1"/>
-              <a:t>changeFork</a:t>
-            </a:r>
-            <a:endParaRPr kumimoji="1" lang="en-US" altLang="zh-CN" sz="1600" dirty="0"/>
-          </a:p>
-          <a:p>
-            <a:pPr marL="342900" indent="-342900">
-              <a:buFont typeface="+mj-lt"/>
-              <a:buAutoNum type="arabicPeriod"/>
-            </a:pPr>
-            <a:r>
-              <a:rPr kumimoji="1" lang="zh-CN" altLang="en-US" sz="1600" dirty="0"/>
-              <a:t>消息详情（ </a:t>
-            </a:r>
-            <a:r>
-              <a:rPr kumimoji="1" lang="en-US" altLang="zh-CN" sz="1600" dirty="0" err="1"/>
-              <a:t>tx</a:t>
-            </a:r>
-            <a:r>
-              <a:rPr kumimoji="1" lang="en-US" altLang="zh-CN" sz="1600" dirty="0"/>
-              <a:t>,</a:t>
-            </a:r>
-            <a:r>
-              <a:rPr kumimoji="1" lang="zh-CN" altLang="en-US" sz="1600" dirty="0"/>
-              <a:t> </a:t>
-            </a:r>
-            <a:r>
-              <a:rPr kumimoji="1" lang="en-US" altLang="zh-CN" sz="1600" dirty="0"/>
-              <a:t>bp,</a:t>
-            </a:r>
-            <a:r>
-              <a:rPr kumimoji="1" lang="zh-CN" altLang="en-US" sz="1600" dirty="0"/>
-              <a:t> </a:t>
-            </a:r>
-            <a:r>
-              <a:rPr kumimoji="1" lang="en-US" altLang="zh-CN" sz="1600" dirty="0"/>
-              <a:t>block,</a:t>
-            </a:r>
-            <a:r>
-              <a:rPr kumimoji="1" lang="zh-CN" altLang="en-US" sz="1600" dirty="0"/>
-              <a:t> </a:t>
-            </a:r>
-            <a:r>
-              <a:rPr kumimoji="1" lang="en-US" altLang="zh-CN" sz="1600" dirty="0">
-                <a:solidFill>
-                  <a:schemeClr val="bg1">
-                    <a:lumMod val="75000"/>
-                  </a:schemeClr>
-                </a:solidFill>
-              </a:rPr>
-              <a:t>fork</a:t>
-            </a:r>
-            <a:r>
-              <a:rPr kumimoji="1" lang="zh-CN" altLang="en-US" sz="1600" dirty="0"/>
-              <a:t>）：队列摘要最重要的信息，点击项，可见更多详情</a:t>
-            </a:r>
-          </a:p>
-        </p:txBody>
-      </p:sp>
-      <p:sp>
-        <p:nvSpPr>
-          <p:cNvPr id="16" name="文本框 15">
-            <a:extLst>
-              <a:ext uri="{FF2B5EF4-FFF2-40B4-BE49-F238E27FC236}">
-                <a16:creationId xmlns:a16="http://schemas.microsoft.com/office/drawing/2014/main" id="{9BD10D48-F2B6-5517-3275-931D99F4999B}"/>
-              </a:ext>
-            </a:extLst>
-          </p:cNvPr>
-          <p:cNvSpPr txBox="1"/>
-          <p:nvPr/>
-        </p:nvSpPr>
-        <p:spPr>
-          <a:xfrm>
-            <a:off x="57618" y="4765266"/>
-            <a:ext cx="5729454" cy="830997"/>
-          </a:xfrm>
-          <a:prstGeom prst="rect">
-            <a:avLst/>
-          </a:prstGeom>
-          <a:solidFill>
-            <a:schemeClr val="bg1"/>
-          </a:solidFill>
-        </p:spPr>
-        <p:txBody>
-          <a:bodyPr wrap="none" rtlCol="0">
-            <a:spAutoFit/>
-          </a:bodyPr>
-          <a:lstStyle/>
-          <a:p>
-            <a:pPr marL="342900" indent="-342900">
-              <a:buFont typeface="+mj-lt"/>
-              <a:buAutoNum type="arabicPeriod"/>
-            </a:pPr>
-            <a:r>
-              <a:rPr kumimoji="1" lang="zh-CN" altLang="en-US" sz="1600" dirty="0"/>
-              <a:t>链：</a:t>
-            </a:r>
-            <a:r>
-              <a:rPr kumimoji="1" lang="en-US" altLang="zh-CN" sz="1600" dirty="0"/>
-              <a:t>block</a:t>
-            </a:r>
-            <a:r>
-              <a:rPr kumimoji="1" lang="zh-CN" altLang="en-US" sz="1600" dirty="0"/>
-              <a:t>（收集者、见证者、通知者</a:t>
-            </a:r>
-            <a:r>
-              <a:rPr kumimoji="1" lang="en-US" altLang="zh-CN" sz="1600" dirty="0"/>
-              <a:t>/</a:t>
-            </a:r>
-            <a:r>
-              <a:rPr kumimoji="1" lang="zh-CN" altLang="en-US" sz="1600" dirty="0"/>
-              <a:t>采纳者数量）、</a:t>
-            </a:r>
-            <a:r>
-              <a:rPr kumimoji="1" lang="en-US" altLang="zh-CN" sz="1600" dirty="0"/>
-              <a:t>fork</a:t>
-            </a:r>
-          </a:p>
-          <a:p>
-            <a:pPr marL="342900" indent="-342900">
-              <a:buFont typeface="+mj-lt"/>
-              <a:buAutoNum type="arabicPeriod"/>
-            </a:pPr>
-            <a:r>
-              <a:rPr kumimoji="1" lang="zh-CN" altLang="en-US" sz="1600" dirty="0"/>
-              <a:t>链的变化（</a:t>
-            </a:r>
-            <a:r>
-              <a:rPr kumimoji="1" lang="en-US" altLang="zh-CN" sz="1600" dirty="0"/>
-              <a:t>fork</a:t>
-            </a:r>
-            <a:r>
-              <a:rPr kumimoji="1" lang="zh-CN" altLang="en-US" sz="1600" dirty="0"/>
-              <a:t>，</a:t>
-            </a:r>
-            <a:r>
-              <a:rPr kumimoji="1" lang="en-US" altLang="zh-CN" sz="1600" dirty="0" err="1"/>
-              <a:t>changeFork</a:t>
-            </a:r>
-            <a:r>
-              <a:rPr kumimoji="1" lang="zh-CN" altLang="en-US" sz="1600" dirty="0"/>
-              <a:t>）</a:t>
-            </a:r>
-            <a:endParaRPr kumimoji="1" lang="en-US" altLang="zh-CN" sz="1600" dirty="0"/>
-          </a:p>
-          <a:p>
-            <a:pPr marL="342900" indent="-342900">
-              <a:buFont typeface="+mj-lt"/>
-              <a:buAutoNum type="arabicPeriod"/>
-            </a:pPr>
-            <a:r>
-              <a:rPr kumimoji="1" lang="en-US" altLang="zh-CN" sz="1600" dirty="0"/>
-              <a:t>block</a:t>
-            </a:r>
-            <a:r>
-              <a:rPr kumimoji="1" lang="zh-CN" altLang="en-US" sz="1600" dirty="0"/>
-              <a:t>浏览器：浏览</a:t>
-            </a:r>
-            <a:r>
-              <a:rPr kumimoji="1" lang="en-US" altLang="zh-CN" sz="1600" dirty="0"/>
-              <a:t>block</a:t>
-            </a:r>
-            <a:r>
-              <a:rPr kumimoji="1" lang="zh-CN" altLang="en-US" sz="1600" dirty="0"/>
-              <a:t>详情</a:t>
-            </a:r>
-          </a:p>
-        </p:txBody>
-      </p:sp>
     </p:spTree>
     <p:extLst>
       <p:ext uri="{BB962C8B-B14F-4D97-AF65-F5344CB8AC3E}">
@@ -5378,13 +5032,13 @@
   <p:clrMapOvr>
     <a:masterClrMapping/>
   </p:clrMapOvr>
-  <mc:AlternateContent xmlns:mc="http://schemas.openxmlformats.org/markup-compatibility/2006">
-    <mc:Choice xmlns:p159="http://schemas.microsoft.com/office/powerpoint/2015/09/main" Requires="p159">
+  <mc:AlternateContent xmlns:mc="http://schemas.openxmlformats.org/markup-compatibility/2006" xmlns:p159="http://schemas.microsoft.com/office/powerpoint/2015/09/main">
+    <mc:Choice Requires="p159">
       <p:transition xmlns:p14="http://schemas.microsoft.com/office/powerpoint/2010/main" spd="slow" p14:dur="2000">
         <p159:morph option="byObject"/>
       </p:transition>
     </mc:Choice>
-    <mc:Fallback>
+    <mc:Fallback xmlns="">
       <p:transition spd="slow">
         <p:fade/>
       </p:transition>
@@ -5504,6 +5158,945 @@
                       </p:childTnLst>
                     </p:cTn>
                   </p:par>
+                </p:childTnLst>
+              </p:cTn>
+              <p:prevCondLst>
+                <p:cond evt="onPrev" delay="0">
+                  <p:tgtEl>
+                    <p:sldTgt/>
+                  </p:tgtEl>
+                </p:cond>
+              </p:prevCondLst>
+              <p:nextCondLst>
+                <p:cond evt="onNext" delay="0">
+                  <p:tgtEl>
+                    <p:sldTgt/>
+                  </p:tgtEl>
+                </p:cond>
+              </p:nextCondLst>
+            </p:seq>
+          </p:childTnLst>
+        </p:cTn>
+      </p:par>
+    </p:tnLst>
+    <p:bldLst>
+      <p:bldP spid="15" grpId="0" animBg="1"/>
+    </p:bldLst>
+  </p:timing>
+</p:sld>
+</file>
+
+<file path=ppt/slides/slide4.xml><?xml version="1.0" encoding="utf-8"?>
+<p:sld xmlns:a="http://schemas.openxmlformats.org/drawingml/2006/main" xmlns:r="http://schemas.openxmlformats.org/officeDocument/2006/relationships" xmlns:p="http://schemas.openxmlformats.org/presentationml/2006/main">
+  <p:cSld>
+    <p:spTree>
+      <p:nvGrpSpPr>
+        <p:cNvPr id="1" name=""/>
+        <p:cNvGrpSpPr/>
+        <p:nvPr/>
+      </p:nvGrpSpPr>
+      <p:grpSpPr>
+        <a:xfrm>
+          <a:off x="0" y="0"/>
+          <a:ext cx="0" cy="0"/>
+          <a:chOff x="0" y="0"/>
+          <a:chExt cx="0" cy="0"/>
+        </a:xfrm>
+      </p:grpSpPr>
+      <p:pic>
+        <p:nvPicPr>
+          <p:cNvPr id="7" name="图片 6" descr="图片包含 图形用户界面&#10;&#10;描述已自动生成">
+            <a:extLst>
+              <a:ext uri="{FF2B5EF4-FFF2-40B4-BE49-F238E27FC236}">
+                <a16:creationId xmlns:a16="http://schemas.microsoft.com/office/drawing/2014/main" id="{7C856005-8FA9-5186-F159-77EB7437CD3D}"/>
+              </a:ext>
+            </a:extLst>
+          </p:cNvPr>
+          <p:cNvPicPr>
+            <a:picLocks noChangeAspect="1"/>
+          </p:cNvPicPr>
+          <p:nvPr/>
+        </p:nvPicPr>
+        <p:blipFill>
+          <a:blip r:embed="rId2"/>
+          <a:stretch>
+            <a:fillRect/>
+          </a:stretch>
+        </p:blipFill>
+        <p:spPr>
+          <a:xfrm>
+            <a:off x="1182560" y="0"/>
+            <a:ext cx="9826879" cy="6858000"/>
+          </a:xfrm>
+          <a:prstGeom prst="rect">
+            <a:avLst/>
+          </a:prstGeom>
+        </p:spPr>
+      </p:pic>
+      <p:sp>
+        <p:nvSpPr>
+          <p:cNvPr id="9" name="矩形 8">
+            <a:extLst>
+              <a:ext uri="{FF2B5EF4-FFF2-40B4-BE49-F238E27FC236}">
+                <a16:creationId xmlns:a16="http://schemas.microsoft.com/office/drawing/2014/main" id="{FE3BE8CE-C287-DA1D-5BA1-A17E9F2B97A3}"/>
+              </a:ext>
+            </a:extLst>
+          </p:cNvPr>
+          <p:cNvSpPr/>
+          <p:nvPr/>
+        </p:nvSpPr>
+        <p:spPr>
+          <a:xfrm>
+            <a:off x="514735" y="290244"/>
+            <a:ext cx="429460" cy="395556"/>
+          </a:xfrm>
+          <a:prstGeom prst="rect">
+            <a:avLst/>
+          </a:prstGeom>
+          <a:ln>
+            <a:noFill/>
+          </a:ln>
+        </p:spPr>
+        <p:style>
+          <a:lnRef idx="2">
+            <a:schemeClr val="accent1">
+              <a:shade val="50000"/>
+            </a:schemeClr>
+          </a:lnRef>
+          <a:fillRef idx="1">
+            <a:schemeClr val="accent1"/>
+          </a:fillRef>
+          <a:effectRef idx="0">
+            <a:schemeClr val="accent1"/>
+          </a:effectRef>
+          <a:fontRef idx="minor">
+            <a:schemeClr val="lt1"/>
+          </a:fontRef>
+        </p:style>
+        <p:txBody>
+          <a:bodyPr rtlCol="0" anchor="ctr"/>
+          <a:lstStyle/>
+          <a:p>
+            <a:pPr algn="ctr"/>
+            <a:r>
+              <a:rPr kumimoji="1" lang="en-US" altLang="zh-CN" sz="1400" b="1" dirty="0"/>
+              <a:t>TX</a:t>
+            </a:r>
+            <a:endParaRPr kumimoji="1" lang="zh-CN" altLang="en-US" sz="1400" b="1" dirty="0"/>
+          </a:p>
+        </p:txBody>
+      </p:sp>
+      <p:sp>
+        <p:nvSpPr>
+          <p:cNvPr id="10" name="矩形 9">
+            <a:extLst>
+              <a:ext uri="{FF2B5EF4-FFF2-40B4-BE49-F238E27FC236}">
+                <a16:creationId xmlns:a16="http://schemas.microsoft.com/office/drawing/2014/main" id="{3960E83E-A0CD-C826-CDD5-3B881E36370B}"/>
+              </a:ext>
+            </a:extLst>
+          </p:cNvPr>
+          <p:cNvSpPr/>
+          <p:nvPr/>
+        </p:nvSpPr>
+        <p:spPr>
+          <a:xfrm>
+            <a:off x="514735" y="854039"/>
+            <a:ext cx="429460" cy="395556"/>
+          </a:xfrm>
+          <a:prstGeom prst="rect">
+            <a:avLst/>
+          </a:prstGeom>
+          <a:solidFill>
+            <a:schemeClr val="bg1">
+              <a:lumMod val="75000"/>
+            </a:schemeClr>
+          </a:solidFill>
+          <a:ln>
+            <a:noFill/>
+          </a:ln>
+        </p:spPr>
+        <p:style>
+          <a:lnRef idx="2">
+            <a:schemeClr val="accent1">
+              <a:shade val="50000"/>
+            </a:schemeClr>
+          </a:lnRef>
+          <a:fillRef idx="1">
+            <a:schemeClr val="accent1"/>
+          </a:fillRef>
+          <a:effectRef idx="0">
+            <a:schemeClr val="accent1"/>
+          </a:effectRef>
+          <a:fontRef idx="minor">
+            <a:schemeClr val="lt1"/>
+          </a:fontRef>
+        </p:style>
+        <p:txBody>
+          <a:bodyPr rtlCol="0" anchor="ctr"/>
+          <a:lstStyle/>
+          <a:p>
+            <a:pPr algn="ctr"/>
+            <a:r>
+              <a:rPr kumimoji="1" lang="en-US" altLang="zh-CN" sz="1400" b="1" dirty="0"/>
+              <a:t>TX</a:t>
+            </a:r>
+            <a:endParaRPr kumimoji="1" lang="zh-CN" altLang="en-US" sz="1400" b="1" dirty="0"/>
+          </a:p>
+        </p:txBody>
+      </p:sp>
+      <p:sp>
+        <p:nvSpPr>
+          <p:cNvPr id="11" name="矩形 10">
+            <a:extLst>
+              <a:ext uri="{FF2B5EF4-FFF2-40B4-BE49-F238E27FC236}">
+                <a16:creationId xmlns:a16="http://schemas.microsoft.com/office/drawing/2014/main" id="{F93231D6-AE3B-4A16-4D37-58C2AD4EB34B}"/>
+              </a:ext>
+            </a:extLst>
+          </p:cNvPr>
+          <p:cNvSpPr/>
+          <p:nvPr/>
+        </p:nvSpPr>
+        <p:spPr>
+          <a:xfrm>
+            <a:off x="514735" y="1511156"/>
+            <a:ext cx="429460" cy="395556"/>
+          </a:xfrm>
+          <a:prstGeom prst="rect">
+            <a:avLst/>
+          </a:prstGeom>
+          <a:solidFill>
+            <a:schemeClr val="accent6">
+              <a:lumMod val="60000"/>
+              <a:lumOff val="40000"/>
+            </a:schemeClr>
+          </a:solidFill>
+          <a:ln>
+            <a:noFill/>
+          </a:ln>
+        </p:spPr>
+        <p:style>
+          <a:lnRef idx="2">
+            <a:schemeClr val="accent1">
+              <a:shade val="50000"/>
+            </a:schemeClr>
+          </a:lnRef>
+          <a:fillRef idx="1">
+            <a:schemeClr val="accent1"/>
+          </a:fillRef>
+          <a:effectRef idx="0">
+            <a:schemeClr val="accent1"/>
+          </a:effectRef>
+          <a:fontRef idx="minor">
+            <a:schemeClr val="lt1"/>
+          </a:fontRef>
+        </p:style>
+        <p:txBody>
+          <a:bodyPr rtlCol="0" anchor="ctr"/>
+          <a:lstStyle/>
+          <a:p>
+            <a:pPr algn="ctr"/>
+            <a:r>
+              <a:rPr kumimoji="1" lang="en-US" altLang="zh-CN" sz="1400" b="1" dirty="0"/>
+              <a:t>BP</a:t>
+            </a:r>
+            <a:endParaRPr kumimoji="1" lang="zh-CN" altLang="en-US" sz="1400" b="1" dirty="0"/>
+          </a:p>
+        </p:txBody>
+      </p:sp>
+      <p:sp>
+        <p:nvSpPr>
+          <p:cNvPr id="12" name="矩形 11">
+            <a:extLst>
+              <a:ext uri="{FF2B5EF4-FFF2-40B4-BE49-F238E27FC236}">
+                <a16:creationId xmlns:a16="http://schemas.microsoft.com/office/drawing/2014/main" id="{4E3F77F7-625C-3298-7489-6CC37DB00CCB}"/>
+              </a:ext>
+            </a:extLst>
+          </p:cNvPr>
+          <p:cNvSpPr/>
+          <p:nvPr/>
+        </p:nvSpPr>
+        <p:spPr>
+          <a:xfrm>
+            <a:off x="514735" y="2074951"/>
+            <a:ext cx="429460" cy="395556"/>
+          </a:xfrm>
+          <a:prstGeom prst="rect">
+            <a:avLst/>
+          </a:prstGeom>
+          <a:solidFill>
+            <a:schemeClr val="bg1">
+              <a:lumMod val="75000"/>
+            </a:schemeClr>
+          </a:solidFill>
+          <a:ln>
+            <a:noFill/>
+          </a:ln>
+        </p:spPr>
+        <p:style>
+          <a:lnRef idx="2">
+            <a:schemeClr val="accent1">
+              <a:shade val="50000"/>
+            </a:schemeClr>
+          </a:lnRef>
+          <a:fillRef idx="1">
+            <a:schemeClr val="accent1"/>
+          </a:fillRef>
+          <a:effectRef idx="0">
+            <a:schemeClr val="accent1"/>
+          </a:effectRef>
+          <a:fontRef idx="minor">
+            <a:schemeClr val="lt1"/>
+          </a:fontRef>
+        </p:style>
+        <p:txBody>
+          <a:bodyPr rtlCol="0" anchor="ctr"/>
+          <a:lstStyle/>
+          <a:p>
+            <a:pPr algn="ctr"/>
+            <a:r>
+              <a:rPr kumimoji="1" lang="en-US" altLang="zh-CN" sz="1400" b="1" dirty="0"/>
+              <a:t>BP</a:t>
+            </a:r>
+            <a:endParaRPr kumimoji="1" lang="zh-CN" altLang="en-US" sz="1400" b="1" dirty="0"/>
+          </a:p>
+        </p:txBody>
+      </p:sp>
+      <p:sp>
+        <p:nvSpPr>
+          <p:cNvPr id="13" name="矩形 12">
+            <a:extLst>
+              <a:ext uri="{FF2B5EF4-FFF2-40B4-BE49-F238E27FC236}">
+                <a16:creationId xmlns:a16="http://schemas.microsoft.com/office/drawing/2014/main" id="{B115578B-E23B-53FD-35A2-3AC9295147C1}"/>
+              </a:ext>
+            </a:extLst>
+          </p:cNvPr>
+          <p:cNvSpPr/>
+          <p:nvPr/>
+        </p:nvSpPr>
+        <p:spPr>
+          <a:xfrm>
+            <a:off x="514735" y="2703816"/>
+            <a:ext cx="429460" cy="395556"/>
+          </a:xfrm>
+          <a:prstGeom prst="rect">
+            <a:avLst/>
+          </a:prstGeom>
+          <a:solidFill>
+            <a:schemeClr val="accent2">
+              <a:lumMod val="75000"/>
+            </a:schemeClr>
+          </a:solidFill>
+          <a:ln>
+            <a:noFill/>
+          </a:ln>
+        </p:spPr>
+        <p:style>
+          <a:lnRef idx="2">
+            <a:schemeClr val="accent1">
+              <a:shade val="50000"/>
+            </a:schemeClr>
+          </a:lnRef>
+          <a:fillRef idx="1">
+            <a:schemeClr val="accent1"/>
+          </a:fillRef>
+          <a:effectRef idx="0">
+            <a:schemeClr val="accent1"/>
+          </a:effectRef>
+          <a:fontRef idx="minor">
+            <a:schemeClr val="lt1"/>
+          </a:fontRef>
+        </p:style>
+        <p:txBody>
+          <a:bodyPr rtlCol="0" anchor="ctr"/>
+          <a:lstStyle/>
+          <a:p>
+            <a:pPr algn="ctr"/>
+            <a:r>
+              <a:rPr kumimoji="1" lang="en-US" altLang="zh-CN" sz="1400" b="1" dirty="0"/>
+              <a:t>Bk</a:t>
+            </a:r>
+            <a:endParaRPr kumimoji="1" lang="zh-CN" altLang="en-US" sz="1400" b="1" dirty="0"/>
+          </a:p>
+        </p:txBody>
+      </p:sp>
+      <p:sp>
+        <p:nvSpPr>
+          <p:cNvPr id="14" name="矩形 13">
+            <a:extLst>
+              <a:ext uri="{FF2B5EF4-FFF2-40B4-BE49-F238E27FC236}">
+                <a16:creationId xmlns:a16="http://schemas.microsoft.com/office/drawing/2014/main" id="{37EE9059-8310-19FA-AE20-CB3C1D91477A}"/>
+              </a:ext>
+            </a:extLst>
+          </p:cNvPr>
+          <p:cNvSpPr/>
+          <p:nvPr/>
+        </p:nvSpPr>
+        <p:spPr>
+          <a:xfrm>
+            <a:off x="514735" y="3267611"/>
+            <a:ext cx="429460" cy="395556"/>
+          </a:xfrm>
+          <a:prstGeom prst="rect">
+            <a:avLst/>
+          </a:prstGeom>
+          <a:solidFill>
+            <a:schemeClr val="bg1">
+              <a:lumMod val="75000"/>
+            </a:schemeClr>
+          </a:solidFill>
+          <a:ln>
+            <a:noFill/>
+          </a:ln>
+        </p:spPr>
+        <p:style>
+          <a:lnRef idx="2">
+            <a:schemeClr val="accent1">
+              <a:shade val="50000"/>
+            </a:schemeClr>
+          </a:lnRef>
+          <a:fillRef idx="1">
+            <a:schemeClr val="accent1"/>
+          </a:fillRef>
+          <a:effectRef idx="0">
+            <a:schemeClr val="accent1"/>
+          </a:effectRef>
+          <a:fontRef idx="minor">
+            <a:schemeClr val="lt1"/>
+          </a:fontRef>
+        </p:style>
+        <p:txBody>
+          <a:bodyPr rtlCol="0" anchor="ctr"/>
+          <a:lstStyle/>
+          <a:p>
+            <a:pPr algn="ctr"/>
+            <a:r>
+              <a:rPr kumimoji="1" lang="en-US" altLang="zh-CN" sz="1400" b="1" dirty="0"/>
+              <a:t>Bk</a:t>
+            </a:r>
+            <a:endParaRPr kumimoji="1" lang="zh-CN" altLang="en-US" sz="1400" b="1" dirty="0"/>
+          </a:p>
+        </p:txBody>
+      </p:sp>
+      <p:sp>
+        <p:nvSpPr>
+          <p:cNvPr id="15" name="矩形 14">
+            <a:extLst>
+              <a:ext uri="{FF2B5EF4-FFF2-40B4-BE49-F238E27FC236}">
+                <a16:creationId xmlns:a16="http://schemas.microsoft.com/office/drawing/2014/main" id="{3923E214-68C8-3C6B-4D2E-0651C9BA4D46}"/>
+              </a:ext>
+            </a:extLst>
+          </p:cNvPr>
+          <p:cNvSpPr/>
+          <p:nvPr/>
+        </p:nvSpPr>
+        <p:spPr>
+          <a:xfrm>
+            <a:off x="514735" y="3924728"/>
+            <a:ext cx="429460" cy="395556"/>
+          </a:xfrm>
+          <a:prstGeom prst="rect">
+            <a:avLst/>
+          </a:prstGeom>
+          <a:solidFill>
+            <a:srgbClr val="AB4DC4"/>
+          </a:solidFill>
+          <a:ln>
+            <a:noFill/>
+          </a:ln>
+        </p:spPr>
+        <p:style>
+          <a:lnRef idx="2">
+            <a:schemeClr val="accent1">
+              <a:shade val="50000"/>
+            </a:schemeClr>
+          </a:lnRef>
+          <a:fillRef idx="1">
+            <a:schemeClr val="accent1"/>
+          </a:fillRef>
+          <a:effectRef idx="0">
+            <a:schemeClr val="accent1"/>
+          </a:effectRef>
+          <a:fontRef idx="minor">
+            <a:schemeClr val="lt1"/>
+          </a:fontRef>
+        </p:style>
+        <p:txBody>
+          <a:bodyPr rtlCol="0" anchor="ctr"/>
+          <a:lstStyle/>
+          <a:p>
+            <a:pPr algn="ctr"/>
+            <a:r>
+              <a:rPr kumimoji="1" lang="en-US" altLang="zh-CN" sz="1400" b="1" dirty="0" err="1"/>
+              <a:t>Fk</a:t>
+            </a:r>
+            <a:endParaRPr kumimoji="1" lang="zh-CN" altLang="en-US" sz="1400" b="1" dirty="0"/>
+          </a:p>
+        </p:txBody>
+      </p:sp>
+      <p:sp>
+        <p:nvSpPr>
+          <p:cNvPr id="16" name="矩形 15">
+            <a:extLst>
+              <a:ext uri="{FF2B5EF4-FFF2-40B4-BE49-F238E27FC236}">
+                <a16:creationId xmlns:a16="http://schemas.microsoft.com/office/drawing/2014/main" id="{F2E3550C-803C-821D-B936-531B2D946C96}"/>
+              </a:ext>
+            </a:extLst>
+          </p:cNvPr>
+          <p:cNvSpPr/>
+          <p:nvPr/>
+        </p:nvSpPr>
+        <p:spPr>
+          <a:xfrm>
+            <a:off x="514735" y="4488523"/>
+            <a:ext cx="429460" cy="395556"/>
+          </a:xfrm>
+          <a:prstGeom prst="rect">
+            <a:avLst/>
+          </a:prstGeom>
+          <a:solidFill>
+            <a:schemeClr val="bg1">
+              <a:lumMod val="75000"/>
+            </a:schemeClr>
+          </a:solidFill>
+          <a:ln>
+            <a:noFill/>
+          </a:ln>
+        </p:spPr>
+        <p:style>
+          <a:lnRef idx="2">
+            <a:schemeClr val="accent1">
+              <a:shade val="50000"/>
+            </a:schemeClr>
+          </a:lnRef>
+          <a:fillRef idx="1">
+            <a:schemeClr val="accent1"/>
+          </a:fillRef>
+          <a:effectRef idx="0">
+            <a:schemeClr val="accent1"/>
+          </a:effectRef>
+          <a:fontRef idx="minor">
+            <a:schemeClr val="lt1"/>
+          </a:fontRef>
+        </p:style>
+        <p:txBody>
+          <a:bodyPr rtlCol="0" anchor="ctr"/>
+          <a:lstStyle/>
+          <a:p>
+            <a:pPr algn="ctr"/>
+            <a:r>
+              <a:rPr kumimoji="1" lang="en-US" altLang="zh-CN" sz="1400" b="1" dirty="0" err="1"/>
+              <a:t>Fk</a:t>
+            </a:r>
+            <a:endParaRPr kumimoji="1" lang="zh-CN" altLang="en-US" sz="1400" b="1" dirty="0"/>
+          </a:p>
+        </p:txBody>
+      </p:sp>
+      <p:sp>
+        <p:nvSpPr>
+          <p:cNvPr id="17" name="矩形 16">
+            <a:extLst>
+              <a:ext uri="{FF2B5EF4-FFF2-40B4-BE49-F238E27FC236}">
+                <a16:creationId xmlns:a16="http://schemas.microsoft.com/office/drawing/2014/main" id="{2F63F8B4-E344-5C7C-1592-6678B1BE70FA}"/>
+              </a:ext>
+            </a:extLst>
+          </p:cNvPr>
+          <p:cNvSpPr/>
+          <p:nvPr/>
+        </p:nvSpPr>
+        <p:spPr>
+          <a:xfrm>
+            <a:off x="3965139" y="6196172"/>
+            <a:ext cx="429460" cy="395556"/>
+          </a:xfrm>
+          <a:prstGeom prst="rect">
+            <a:avLst/>
+          </a:prstGeom>
+          <a:ln>
+            <a:noFill/>
+          </a:ln>
+        </p:spPr>
+        <p:style>
+          <a:lnRef idx="2">
+            <a:schemeClr val="accent1">
+              <a:shade val="50000"/>
+            </a:schemeClr>
+          </a:lnRef>
+          <a:fillRef idx="1">
+            <a:schemeClr val="accent1"/>
+          </a:fillRef>
+          <a:effectRef idx="0">
+            <a:schemeClr val="accent1"/>
+          </a:effectRef>
+          <a:fontRef idx="minor">
+            <a:schemeClr val="lt1"/>
+          </a:fontRef>
+        </p:style>
+        <p:txBody>
+          <a:bodyPr rtlCol="0" anchor="ctr"/>
+          <a:lstStyle/>
+          <a:p>
+            <a:pPr algn="ctr"/>
+            <a:r>
+              <a:rPr kumimoji="1" lang="en-US" altLang="zh-CN" sz="1400" b="1" dirty="0"/>
+              <a:t>TX</a:t>
+            </a:r>
+            <a:endParaRPr kumimoji="1" lang="zh-CN" altLang="en-US" sz="1400" b="1" dirty="0"/>
+          </a:p>
+        </p:txBody>
+      </p:sp>
+      <p:sp>
+        <p:nvSpPr>
+          <p:cNvPr id="18" name="矩形 17">
+            <a:extLst>
+              <a:ext uri="{FF2B5EF4-FFF2-40B4-BE49-F238E27FC236}">
+                <a16:creationId xmlns:a16="http://schemas.microsoft.com/office/drawing/2014/main" id="{1EDCECFD-3F3B-1F27-E9A5-773ED4D49786}"/>
+              </a:ext>
+            </a:extLst>
+          </p:cNvPr>
+          <p:cNvSpPr/>
+          <p:nvPr/>
+        </p:nvSpPr>
+        <p:spPr>
+          <a:xfrm>
+            <a:off x="4127471" y="655833"/>
+            <a:ext cx="429460" cy="395556"/>
+          </a:xfrm>
+          <a:prstGeom prst="rect">
+            <a:avLst/>
+          </a:prstGeom>
+          <a:ln>
+            <a:noFill/>
+          </a:ln>
+        </p:spPr>
+        <p:style>
+          <a:lnRef idx="2">
+            <a:schemeClr val="accent1">
+              <a:shade val="50000"/>
+            </a:schemeClr>
+          </a:lnRef>
+          <a:fillRef idx="1">
+            <a:schemeClr val="accent1"/>
+          </a:fillRef>
+          <a:effectRef idx="0">
+            <a:schemeClr val="accent1"/>
+          </a:effectRef>
+          <a:fontRef idx="minor">
+            <a:schemeClr val="lt1"/>
+          </a:fontRef>
+        </p:style>
+        <p:txBody>
+          <a:bodyPr rtlCol="0" anchor="ctr"/>
+          <a:lstStyle/>
+          <a:p>
+            <a:pPr algn="ctr"/>
+            <a:r>
+              <a:rPr kumimoji="1" lang="en-US" altLang="zh-CN" sz="1400" b="1" dirty="0"/>
+              <a:t>TX</a:t>
+            </a:r>
+            <a:endParaRPr kumimoji="1" lang="zh-CN" altLang="en-US" sz="1400" b="1" dirty="0"/>
+          </a:p>
+        </p:txBody>
+      </p:sp>
+      <p:sp>
+        <p:nvSpPr>
+          <p:cNvPr id="19" name="矩形 18">
+            <a:extLst>
+              <a:ext uri="{FF2B5EF4-FFF2-40B4-BE49-F238E27FC236}">
+                <a16:creationId xmlns:a16="http://schemas.microsoft.com/office/drawing/2014/main" id="{6F22137B-E1AA-9B5B-E0ED-D1162A07640C}"/>
+              </a:ext>
+            </a:extLst>
+          </p:cNvPr>
+          <p:cNvSpPr/>
+          <p:nvPr/>
+        </p:nvSpPr>
+        <p:spPr>
+          <a:xfrm>
+            <a:off x="4127471" y="655833"/>
+            <a:ext cx="429460" cy="395556"/>
+          </a:xfrm>
+          <a:prstGeom prst="rect">
+            <a:avLst/>
+          </a:prstGeom>
+          <a:solidFill>
+            <a:schemeClr val="bg1">
+              <a:lumMod val="75000"/>
+            </a:schemeClr>
+          </a:solidFill>
+          <a:ln>
+            <a:noFill/>
+          </a:ln>
+        </p:spPr>
+        <p:style>
+          <a:lnRef idx="2">
+            <a:schemeClr val="accent1">
+              <a:shade val="50000"/>
+            </a:schemeClr>
+          </a:lnRef>
+          <a:fillRef idx="1">
+            <a:schemeClr val="accent1"/>
+          </a:fillRef>
+          <a:effectRef idx="0">
+            <a:schemeClr val="accent1"/>
+          </a:effectRef>
+          <a:fontRef idx="minor">
+            <a:schemeClr val="lt1"/>
+          </a:fontRef>
+        </p:style>
+        <p:txBody>
+          <a:bodyPr rtlCol="0" anchor="ctr"/>
+          <a:lstStyle/>
+          <a:p>
+            <a:pPr algn="ctr"/>
+            <a:r>
+              <a:rPr kumimoji="1" lang="en-US" altLang="zh-CN" sz="1400" b="1" dirty="0"/>
+              <a:t>TX</a:t>
+            </a:r>
+            <a:endParaRPr kumimoji="1" lang="zh-CN" altLang="en-US" sz="1400" b="1" dirty="0"/>
+          </a:p>
+        </p:txBody>
+      </p:sp>
+      <p:sp>
+        <p:nvSpPr>
+          <p:cNvPr id="21" name="矩形 20">
+            <a:extLst>
+              <a:ext uri="{FF2B5EF4-FFF2-40B4-BE49-F238E27FC236}">
+                <a16:creationId xmlns:a16="http://schemas.microsoft.com/office/drawing/2014/main" id="{1741556E-3194-77A7-C0EF-793B4A00C78B}"/>
+              </a:ext>
+            </a:extLst>
+          </p:cNvPr>
+          <p:cNvSpPr/>
+          <p:nvPr/>
+        </p:nvSpPr>
+        <p:spPr>
+          <a:xfrm>
+            <a:off x="4127471" y="655833"/>
+            <a:ext cx="429460" cy="395556"/>
+          </a:xfrm>
+          <a:prstGeom prst="rect">
+            <a:avLst/>
+          </a:prstGeom>
+          <a:solidFill>
+            <a:schemeClr val="accent6">
+              <a:lumMod val="60000"/>
+              <a:lumOff val="40000"/>
+            </a:schemeClr>
+          </a:solidFill>
+          <a:ln>
+            <a:noFill/>
+          </a:ln>
+        </p:spPr>
+        <p:style>
+          <a:lnRef idx="2">
+            <a:schemeClr val="accent1">
+              <a:shade val="50000"/>
+            </a:schemeClr>
+          </a:lnRef>
+          <a:fillRef idx="1">
+            <a:schemeClr val="accent1"/>
+          </a:fillRef>
+          <a:effectRef idx="0">
+            <a:schemeClr val="accent1"/>
+          </a:effectRef>
+          <a:fontRef idx="minor">
+            <a:schemeClr val="lt1"/>
+          </a:fontRef>
+        </p:style>
+        <p:txBody>
+          <a:bodyPr rtlCol="0" anchor="ctr"/>
+          <a:lstStyle/>
+          <a:p>
+            <a:pPr algn="ctr"/>
+            <a:r>
+              <a:rPr kumimoji="1" lang="en-US" altLang="zh-CN" sz="1400" b="1" dirty="0"/>
+              <a:t>BP</a:t>
+            </a:r>
+            <a:endParaRPr kumimoji="1" lang="zh-CN" altLang="en-US" sz="1400" b="1" dirty="0"/>
+          </a:p>
+        </p:txBody>
+      </p:sp>
+      <p:sp>
+        <p:nvSpPr>
+          <p:cNvPr id="20" name="矩形 19">
+            <a:extLst>
+              <a:ext uri="{FF2B5EF4-FFF2-40B4-BE49-F238E27FC236}">
+                <a16:creationId xmlns:a16="http://schemas.microsoft.com/office/drawing/2014/main" id="{79A358AD-363D-B43B-49A0-477E450E74D7}"/>
+              </a:ext>
+            </a:extLst>
+          </p:cNvPr>
+          <p:cNvSpPr/>
+          <p:nvPr/>
+        </p:nvSpPr>
+        <p:spPr>
+          <a:xfrm>
+            <a:off x="7476225" y="5305003"/>
+            <a:ext cx="429460" cy="395556"/>
+          </a:xfrm>
+          <a:prstGeom prst="rect">
+            <a:avLst/>
+          </a:prstGeom>
+          <a:solidFill>
+            <a:schemeClr val="accent6">
+              <a:lumMod val="60000"/>
+              <a:lumOff val="40000"/>
+            </a:schemeClr>
+          </a:solidFill>
+          <a:ln>
+            <a:noFill/>
+          </a:ln>
+        </p:spPr>
+        <p:style>
+          <a:lnRef idx="2">
+            <a:schemeClr val="accent1">
+              <a:shade val="50000"/>
+            </a:schemeClr>
+          </a:lnRef>
+          <a:fillRef idx="1">
+            <a:schemeClr val="accent1"/>
+          </a:fillRef>
+          <a:effectRef idx="0">
+            <a:schemeClr val="accent1"/>
+          </a:effectRef>
+          <a:fontRef idx="minor">
+            <a:schemeClr val="lt1"/>
+          </a:fontRef>
+        </p:style>
+        <p:txBody>
+          <a:bodyPr rtlCol="0" anchor="ctr"/>
+          <a:lstStyle/>
+          <a:p>
+            <a:pPr algn="ctr"/>
+            <a:r>
+              <a:rPr kumimoji="1" lang="en-US" altLang="zh-CN" sz="1400" b="1" dirty="0"/>
+              <a:t>BP</a:t>
+            </a:r>
+            <a:endParaRPr kumimoji="1" lang="zh-CN" altLang="en-US" sz="1400" b="1" dirty="0"/>
+          </a:p>
+        </p:txBody>
+      </p:sp>
+    </p:spTree>
+    <p:extLst>
+      <p:ext uri="{BB962C8B-B14F-4D97-AF65-F5344CB8AC3E}">
+        <p14:creationId xmlns:p14="http://schemas.microsoft.com/office/powerpoint/2010/main" val="2745697044"/>
+      </p:ext>
+    </p:extLst>
+  </p:cSld>
+  <p:clrMapOvr>
+    <a:masterClrMapping/>
+  </p:clrMapOvr>
+  <p:timing>
+    <p:tnLst>
+      <p:par>
+        <p:cTn id="1" dur="indefinite" restart="never" nodeType="tmRoot">
+          <p:childTnLst>
+            <p:seq concurrent="1" nextAc="seek">
+              <p:cTn id="2" dur="indefinite" nodeType="mainSeq">
+                <p:childTnLst>
+                  <p:par>
+                    <p:cTn id="3" fill="hold">
+                      <p:stCondLst>
+                        <p:cond delay="indefinite"/>
+                      </p:stCondLst>
+                      <p:childTnLst>
+                        <p:par>
+                          <p:cTn id="4" fill="hold">
+                            <p:stCondLst>
+                              <p:cond delay="0"/>
+                            </p:stCondLst>
+                            <p:childTnLst>
+                              <p:par>
+                                <p:cTn id="5" presetID="9" presetClass="entr" presetSubtype="0" fill="hold" grpId="0" nodeType="clickEffect">
+                                  <p:stCondLst>
+                                    <p:cond delay="0"/>
+                                  </p:stCondLst>
+                                  <p:childTnLst>
+                                    <p:set>
+                                      <p:cBhvr>
+                                        <p:cTn id="6" dur="1" fill="hold">
+                                          <p:stCondLst>
+                                            <p:cond delay="0"/>
+                                          </p:stCondLst>
+                                        </p:cTn>
+                                        <p:tgtEl>
+                                          <p:spTgt spid="18"/>
+                                        </p:tgtEl>
+                                        <p:attrNameLst>
+                                          <p:attrName>style.visibility</p:attrName>
+                                        </p:attrNameLst>
+                                      </p:cBhvr>
+                                      <p:to>
+                                        <p:strVal val="visible"/>
+                                      </p:to>
+                                    </p:set>
+                                    <p:animEffect transition="in" filter="dissolve">
+                                      <p:cBhvr>
+                                        <p:cTn id="7" dur="500"/>
+                                        <p:tgtEl>
+                                          <p:spTgt spid="18"/>
+                                        </p:tgtEl>
+                                      </p:cBhvr>
+                                    </p:animEffect>
+                                  </p:childTnLst>
+                                </p:cTn>
+                              </p:par>
+                            </p:childTnLst>
+                          </p:cTn>
+                        </p:par>
+                      </p:childTnLst>
+                    </p:cTn>
+                  </p:par>
+                  <p:par>
+                    <p:cTn id="8" fill="hold">
+                      <p:stCondLst>
+                        <p:cond delay="indefinite"/>
+                      </p:stCondLst>
+                      <p:childTnLst>
+                        <p:par>
+                          <p:cTn id="9" fill="hold">
+                            <p:stCondLst>
+                              <p:cond delay="0"/>
+                            </p:stCondLst>
+                            <p:childTnLst>
+                              <p:par>
+                                <p:cTn id="10" presetID="9" presetClass="entr" presetSubtype="0" fill="hold" grpId="0" nodeType="clickEffect">
+                                  <p:stCondLst>
+                                    <p:cond delay="0"/>
+                                  </p:stCondLst>
+                                  <p:childTnLst>
+                                    <p:set>
+                                      <p:cBhvr>
+                                        <p:cTn id="11" dur="1" fill="hold">
+                                          <p:stCondLst>
+                                            <p:cond delay="0"/>
+                                          </p:stCondLst>
+                                        </p:cTn>
+                                        <p:tgtEl>
+                                          <p:spTgt spid="19"/>
+                                        </p:tgtEl>
+                                        <p:attrNameLst>
+                                          <p:attrName>style.visibility</p:attrName>
+                                        </p:attrNameLst>
+                                      </p:cBhvr>
+                                      <p:to>
+                                        <p:strVal val="visible"/>
+                                      </p:to>
+                                    </p:set>
+                                    <p:animEffect transition="in" filter="dissolve">
+                                      <p:cBhvr>
+                                        <p:cTn id="12" dur="500"/>
+                                        <p:tgtEl>
+                                          <p:spTgt spid="19"/>
+                                        </p:tgtEl>
+                                      </p:cBhvr>
+                                    </p:animEffect>
+                                  </p:childTnLst>
+                                </p:cTn>
+                              </p:par>
+                            </p:childTnLst>
+                          </p:cTn>
+                        </p:par>
+                      </p:childTnLst>
+                    </p:cTn>
+                  </p:par>
                   <p:par>
                     <p:cTn id="13" fill="hold">
                       <p:stCondLst>
@@ -5517,7 +6110,7 @@
                             </p:stCondLst>
                             <p:childTnLst>
                               <p:par>
-                                <p:cTn id="15" presetID="9" presetClass="entr" presetSubtype="0" fill="hold" grpId="0" nodeType="clickEffect">
+                                <p:cTn id="15" presetID="1" presetClass="exit" presetSubtype="0" fill="hold" grpId="1" nodeType="clickEffect">
                                   <p:stCondLst>
                                     <p:cond delay="0"/>
                                   </p:stCondLst>
@@ -5530,7 +6123,106 @@
                                           </p:stCondLst>
                                         </p:cTn>
                                         <p:tgtEl>
-                                          <p:spTgt spid="14"/>
+                                          <p:spTgt spid="18"/>
+                                        </p:tgtEl>
+                                        <p:attrNameLst>
+                                          <p:attrName>style.visibility</p:attrName>
+                                        </p:attrNameLst>
+                                      </p:cBhvr>
+                                      <p:to>
+                                        <p:strVal val="hidden"/>
+                                      </p:to>
+                                    </p:set>
+                                  </p:childTnLst>
+                                </p:cTn>
+                              </p:par>
+                              <p:par>
+                                <p:cTn id="17" presetID="1" presetClass="exit" presetSubtype="0" fill="hold" grpId="1" nodeType="withEffect">
+                                  <p:stCondLst>
+                                    <p:cond delay="0"/>
+                                  </p:stCondLst>
+                                  <p:childTnLst>
+                                    <p:set>
+                                      <p:cBhvr>
+                                        <p:cTn id="18" dur="1" fill="hold">
+                                          <p:stCondLst>
+                                            <p:cond delay="0"/>
+                                          </p:stCondLst>
+                                        </p:cTn>
+                                        <p:tgtEl>
+                                          <p:spTgt spid="19"/>
+                                        </p:tgtEl>
+                                        <p:attrNameLst>
+                                          <p:attrName>style.visibility</p:attrName>
+                                        </p:attrNameLst>
+                                      </p:cBhvr>
+                                      <p:to>
+                                        <p:strVal val="hidden"/>
+                                      </p:to>
+                                    </p:set>
+                                  </p:childTnLst>
+                                </p:cTn>
+                              </p:par>
+                              <p:par>
+                                <p:cTn id="19" presetID="1" presetClass="exit" presetSubtype="0" fill="hold" grpId="0" nodeType="withEffect">
+                                  <p:stCondLst>
+                                    <p:cond delay="0"/>
+                                  </p:stCondLst>
+                                  <p:childTnLst>
+                                    <p:set>
+                                      <p:cBhvr>
+                                        <p:cTn id="20" dur="1" fill="hold">
+                                          <p:stCondLst>
+                                            <p:cond delay="0"/>
+                                          </p:stCondLst>
+                                        </p:cTn>
+                                        <p:tgtEl>
+                                          <p:spTgt spid="17"/>
+                                        </p:tgtEl>
+                                        <p:attrNameLst>
+                                          <p:attrName>style.visibility</p:attrName>
+                                        </p:attrNameLst>
+                                      </p:cBhvr>
+                                      <p:to>
+                                        <p:strVal val="hidden"/>
+                                      </p:to>
+                                    </p:set>
+                                  </p:childTnLst>
+                                </p:cTn>
+                              </p:par>
+                            </p:childTnLst>
+                          </p:cTn>
+                        </p:par>
+                      </p:childTnLst>
+                    </p:cTn>
+                  </p:par>
+                  <p:par>
+                    <p:cTn id="21" fill="hold">
+                      <p:stCondLst>
+                        <p:cond delay="indefinite"/>
+                      </p:stCondLst>
+                      <p:childTnLst>
+                        <p:par>
+                          <p:cTn id="22" fill="hold">
+                            <p:stCondLst>
+                              <p:cond delay="0"/>
+                            </p:stCondLst>
+                            <p:childTnLst>
+                              <p:par>
+                                <p:cTn id="23" presetID="9" presetClass="entr" presetSubtype="0" fill="hold" grpId="0" nodeType="clickEffect">
+                                  <p:stCondLst>
+                                    <p:cond delay="0"/>
+                                  </p:stCondLst>
+                                  <p:childTnLst>
+                                    <p:set>
+                                      <p:cBhvr>
+                                        <p:cTn id="24" dur="1" fill="hold">
+                                          <p:stCondLst>
+                                            <p:cond delay="0"/>
+                                          </p:stCondLst>
+                                        </p:cTn>
+                                        <p:tgtEl>
+                                          <p:spTgt spid="21"/>
                                         </p:tgtEl>
                                         <p:attrNameLst>
                                           <p:attrName>style.visibility</p:attrName>
@@ -5542,9 +6234,9 @@
                                     </p:set>
                                     <p:animEffect transition="in" filter="dissolve">
                                       <p:cBhvr>
-                                        <p:cTn id="17" dur="500"/>
+                                        <p:cTn id="25" dur="500"/>
                                         <p:tgtEl>
-                                          <p:spTgt spid="14"/>
+                                          <p:spTgt spid="21"/>
                                         </p:tgtEl>
                                       </p:cBhvr>
                                     </p:animEffect>
@@ -5558,32 +6250,32 @@
                     </p:cTn>
                   </p:par>
                   <p:par>
-                    <p:cTn id="18" fill="hold">
+                    <p:cTn id="26" fill="hold">
                       <p:stCondLst>
                         <p:cond delay="indefinite"/>
                       </p:stCondLst>
                       <p:childTnLst>
                         <p:par>
-                          <p:cTn id="19" fill="hold">
+                          <p:cTn id="27" fill="hold">
                             <p:stCondLst>
                               <p:cond delay="0"/>
                             </p:stCondLst>
                             <p:childTnLst>
                               <p:par>
-                                <p:cTn id="20" presetID="9" presetClass="entr" presetSubtype="0" fill="hold" grpId="0" nodeType="clickEffect">
+                                <p:cTn id="28" presetID="9" presetClass="entr" presetSubtype="0" fill="hold" grpId="0" nodeType="clickEffect">
                                   <p:stCondLst>
                                     <p:cond delay="0"/>
                                   </p:stCondLst>
                                   <p:childTnLst>
                                     <p:set>
                                       <p:cBhvr>
-                                        <p:cTn id="21" dur="1" fill="hold">
+                                        <p:cTn id="29" dur="1" fill="hold">
                                           <p:stCondLst>
                                             <p:cond delay="0"/>
                                           </p:stCondLst>
                                         </p:cTn>
                                         <p:tgtEl>
-                                          <p:spTgt spid="16"/>
+                                          <p:spTgt spid="20"/>
                                         </p:tgtEl>
                                         <p:attrNameLst>
                                           <p:attrName>style.visibility</p:attrName>
@@ -5595,9 +6287,9 @@
                                     </p:set>
                                     <p:animEffect transition="in" filter="dissolve">
                                       <p:cBhvr>
-                                        <p:cTn id="22" dur="500"/>
+                                        <p:cTn id="30" dur="500"/>
                                         <p:tgtEl>
-                                          <p:spTgt spid="16"/>
+                                          <p:spTgt spid="20"/>
                                         </p:tgtEl>
                                       </p:cBhvr>
                                     </p:animEffect>
@@ -5632,15 +6324,19 @@
       </p:par>
     </p:tnLst>
     <p:bldLst>
-      <p:bldP spid="15" grpId="0" animBg="1"/>
-      <p:bldP spid="14" grpId="0" animBg="1"/>
-      <p:bldP spid="16" grpId="0" animBg="1"/>
+      <p:bldP spid="17" grpId="0" animBg="1"/>
+      <p:bldP spid="18" grpId="0" animBg="1"/>
+      <p:bldP spid="18" grpId="1" animBg="1"/>
+      <p:bldP spid="19" grpId="0" animBg="1"/>
+      <p:bldP spid="19" grpId="1" animBg="1"/>
+      <p:bldP spid="21" grpId="0" animBg="1"/>
+      <p:bldP spid="20" grpId="0" animBg="1"/>
     </p:bldLst>
   </p:timing>
 </p:sld>
 </file>
 
-<file path=ppt/slides/slide4.xml><?xml version="1.0" encoding="utf-8"?>
+<file path=ppt/slides/slide5.xml><?xml version="1.0" encoding="utf-8"?>
 <p:sld xmlns:a="http://schemas.openxmlformats.org/drawingml/2006/main" xmlns:r="http://schemas.openxmlformats.org/officeDocument/2006/relationships" xmlns:p="http://schemas.openxmlformats.org/presentationml/2006/main">
   <p:cSld>
     <p:spTree>
@@ -6689,7 +7385,7 @@
 </p:sld>
 </file>
 
-<file path=ppt/slides/slide5.xml><?xml version="1.0" encoding="utf-8"?>
+<file path=ppt/slides/slide6.xml><?xml version="1.0" encoding="utf-8"?>
 <p:sld xmlns:a="http://schemas.openxmlformats.org/drawingml/2006/main" xmlns:r="http://schemas.openxmlformats.org/officeDocument/2006/relationships" xmlns:p="http://schemas.openxmlformats.org/presentationml/2006/main">
   <p:cSld>
     <p:spTree>
@@ -7872,6 +8568,428 @@
 </p:sld>
 </file>
 
+<file path=ppt/slides/slide7.xml><?xml version="1.0" encoding="utf-8"?>
+<p:sld xmlns:a="http://schemas.openxmlformats.org/drawingml/2006/main" xmlns:r="http://schemas.openxmlformats.org/officeDocument/2006/relationships" xmlns:p="http://schemas.openxmlformats.org/presentationml/2006/main">
+  <p:cSld>
+    <p:spTree>
+      <p:nvGrpSpPr>
+        <p:cNvPr id="1" name=""/>
+        <p:cNvGrpSpPr/>
+        <p:nvPr/>
+      </p:nvGrpSpPr>
+      <p:grpSpPr>
+        <a:xfrm>
+          <a:off x="0" y="0"/>
+          <a:ext cx="0" cy="0"/>
+          <a:chOff x="0" y="0"/>
+          <a:chExt cx="0" cy="0"/>
+        </a:xfrm>
+      </p:grpSpPr>
+      <p:sp>
+        <p:nvSpPr>
+          <p:cNvPr id="4" name="文本框 3">
+            <a:extLst>
+              <a:ext uri="{FF2B5EF4-FFF2-40B4-BE49-F238E27FC236}">
+                <a16:creationId xmlns:a16="http://schemas.microsoft.com/office/drawing/2014/main" id="{CB8E60AA-98EB-54F3-C6B9-EF58F6D729CA}"/>
+              </a:ext>
+            </a:extLst>
+          </p:cNvPr>
+          <p:cNvSpPr txBox="1"/>
+          <p:nvPr/>
+        </p:nvSpPr>
+        <p:spPr>
+          <a:xfrm>
+            <a:off x="4361935" y="543697"/>
+            <a:ext cx="3411511" cy="369332"/>
+          </a:xfrm>
+          <a:prstGeom prst="rect">
+            <a:avLst/>
+          </a:prstGeom>
+          <a:noFill/>
+        </p:spPr>
+        <p:txBody>
+          <a:bodyPr wrap="none" rtlCol="0">
+            <a:spAutoFit/>
+          </a:bodyPr>
+          <a:lstStyle/>
+          <a:p>
+            <a:r>
+              <a:rPr kumimoji="1" lang="en-US" altLang="zh-CN" dirty="0"/>
+              <a:t>Blockchain</a:t>
+            </a:r>
+            <a:r>
+              <a:rPr kumimoji="1" lang="zh-CN" altLang="en-US" dirty="0"/>
+              <a:t> </a:t>
+            </a:r>
+            <a:r>
+              <a:rPr kumimoji="1" lang="en-US" altLang="zh-CN" dirty="0"/>
+              <a:t>Diagram:</a:t>
+            </a:r>
+            <a:r>
+              <a:rPr kumimoji="1" lang="zh-CN" altLang="en-US" dirty="0"/>
+              <a:t> 两阶段铸造</a:t>
+            </a:r>
+          </a:p>
+        </p:txBody>
+      </p:sp>
+      <p:sp>
+        <p:nvSpPr>
+          <p:cNvPr id="5" name="文本框 4">
+            <a:extLst>
+              <a:ext uri="{FF2B5EF4-FFF2-40B4-BE49-F238E27FC236}">
+                <a16:creationId xmlns:a16="http://schemas.microsoft.com/office/drawing/2014/main" id="{6081BDE6-8D65-4FC0-8F11-67D07DE4EE73}"/>
+              </a:ext>
+            </a:extLst>
+          </p:cNvPr>
+          <p:cNvSpPr txBox="1"/>
+          <p:nvPr/>
+        </p:nvSpPr>
+        <p:spPr>
+          <a:xfrm>
+            <a:off x="597243" y="1066800"/>
+            <a:ext cx="6845144" cy="1477328"/>
+          </a:xfrm>
+          <a:prstGeom prst="rect">
+            <a:avLst/>
+          </a:prstGeom>
+          <a:noFill/>
+        </p:spPr>
+        <p:txBody>
+          <a:bodyPr wrap="none" rtlCol="0">
+            <a:spAutoFit/>
+          </a:bodyPr>
+          <a:lstStyle/>
+          <a:p>
+            <a:r>
+              <a:rPr kumimoji="1" lang="zh-CN" altLang="en-US" dirty="0"/>
+              <a:t>功能</a:t>
+            </a:r>
+            <a:endParaRPr kumimoji="1" lang="en-US" altLang="zh-CN" dirty="0"/>
+          </a:p>
+          <a:p>
+            <a:pPr marL="342900" indent="-342900">
+              <a:buFont typeface="+mj-lt"/>
+              <a:buAutoNum type="arabicPeriod"/>
+            </a:pPr>
+            <a:r>
+              <a:rPr kumimoji="1" lang="zh-CN" altLang="en-US" dirty="0"/>
+              <a:t>显示两阶段铸造（</a:t>
+            </a:r>
+            <a:r>
+              <a:rPr kumimoji="1" lang="en-US" altLang="zh-CN" dirty="0"/>
+              <a:t>chain</a:t>
+            </a:r>
+            <a:r>
+              <a:rPr kumimoji="1" lang="zh-CN" altLang="en-US" dirty="0"/>
+              <a:t>）</a:t>
+            </a:r>
+            <a:endParaRPr kumimoji="1" lang="en-US" altLang="zh-CN" dirty="0"/>
+          </a:p>
+          <a:p>
+            <a:pPr marL="800100" lvl="1" indent="-342900">
+              <a:buFont typeface="+mj-lt"/>
+              <a:buAutoNum type="arabicPeriod"/>
+            </a:pPr>
+            <a:r>
+              <a:rPr kumimoji="1" lang="zh-CN" altLang="en-US" dirty="0"/>
+              <a:t>链：</a:t>
+            </a:r>
+            <a:r>
+              <a:rPr kumimoji="1" lang="en-US" altLang="zh-CN" dirty="0"/>
+              <a:t>block</a:t>
+            </a:r>
+            <a:r>
+              <a:rPr kumimoji="1" lang="zh-CN" altLang="en-US" dirty="0"/>
+              <a:t>（收集者、见证者、通知者</a:t>
+            </a:r>
+            <a:r>
+              <a:rPr kumimoji="1" lang="en-US" altLang="zh-CN" dirty="0"/>
+              <a:t>/</a:t>
+            </a:r>
+            <a:r>
+              <a:rPr kumimoji="1" lang="zh-CN" altLang="en-US" dirty="0"/>
+              <a:t>采纳者数量）、</a:t>
+            </a:r>
+            <a:r>
+              <a:rPr kumimoji="1" lang="en-US" altLang="zh-CN" dirty="0"/>
+              <a:t>fork</a:t>
+            </a:r>
+          </a:p>
+          <a:p>
+            <a:pPr marL="800100" lvl="1" indent="-342900">
+              <a:buFont typeface="+mj-lt"/>
+              <a:buAutoNum type="arabicPeriod"/>
+            </a:pPr>
+            <a:r>
+              <a:rPr kumimoji="1" lang="zh-CN" altLang="en-US" dirty="0"/>
+              <a:t>链的变化（</a:t>
+            </a:r>
+            <a:r>
+              <a:rPr kumimoji="1" lang="en-US" altLang="zh-CN" dirty="0"/>
+              <a:t>fork</a:t>
+            </a:r>
+            <a:r>
+              <a:rPr kumimoji="1" lang="zh-CN" altLang="en-US" dirty="0"/>
+              <a:t>，</a:t>
+            </a:r>
+            <a:r>
+              <a:rPr kumimoji="1" lang="en-US" altLang="zh-CN" dirty="0" err="1"/>
+              <a:t>changeFork</a:t>
+            </a:r>
+            <a:r>
+              <a:rPr kumimoji="1" lang="zh-CN" altLang="en-US" dirty="0"/>
+              <a:t>）</a:t>
+            </a:r>
+            <a:endParaRPr kumimoji="1" lang="en-US" altLang="zh-CN" dirty="0"/>
+          </a:p>
+          <a:p>
+            <a:pPr marL="800100" lvl="1" indent="-342900">
+              <a:buFont typeface="+mj-lt"/>
+              <a:buAutoNum type="arabicPeriod"/>
+            </a:pPr>
+            <a:r>
+              <a:rPr kumimoji="1" lang="en-US" altLang="zh-CN" dirty="0"/>
+              <a:t>block</a:t>
+            </a:r>
+            <a:r>
+              <a:rPr kumimoji="1" lang="zh-CN" altLang="en-US" dirty="0"/>
+              <a:t>浏览器：浏览</a:t>
+            </a:r>
+            <a:r>
+              <a:rPr kumimoji="1" lang="en-US" altLang="zh-CN" dirty="0"/>
+              <a:t>block</a:t>
+            </a:r>
+            <a:r>
+              <a:rPr kumimoji="1" lang="zh-CN" altLang="en-US" dirty="0"/>
+              <a:t>详情</a:t>
+            </a:r>
+          </a:p>
+        </p:txBody>
+      </p:sp>
+    </p:spTree>
+    <p:extLst>
+      <p:ext uri="{BB962C8B-B14F-4D97-AF65-F5344CB8AC3E}">
+        <p14:creationId xmlns:p14="http://schemas.microsoft.com/office/powerpoint/2010/main" val="1129705230"/>
+      </p:ext>
+    </p:extLst>
+  </p:cSld>
+  <p:clrMapOvr>
+    <a:masterClrMapping/>
+  </p:clrMapOvr>
+</p:sld>
+</file>
+
+<file path=ppt/slides/slide8.xml><?xml version="1.0" encoding="utf-8"?>
+<p:sld xmlns:a="http://schemas.openxmlformats.org/drawingml/2006/main" xmlns:r="http://schemas.openxmlformats.org/officeDocument/2006/relationships" xmlns:p="http://schemas.openxmlformats.org/presentationml/2006/main">
+  <p:cSld>
+    <p:spTree>
+      <p:nvGrpSpPr>
+        <p:cNvPr id="1" name=""/>
+        <p:cNvGrpSpPr/>
+        <p:nvPr/>
+      </p:nvGrpSpPr>
+      <p:grpSpPr>
+        <a:xfrm>
+          <a:off x="0" y="0"/>
+          <a:ext cx="0" cy="0"/>
+          <a:chOff x="0" y="0"/>
+          <a:chExt cx="0" cy="0"/>
+        </a:xfrm>
+      </p:grpSpPr>
+      <p:sp>
+        <p:nvSpPr>
+          <p:cNvPr id="4" name="文本框 3">
+            <a:extLst>
+              <a:ext uri="{FF2B5EF4-FFF2-40B4-BE49-F238E27FC236}">
+                <a16:creationId xmlns:a16="http://schemas.microsoft.com/office/drawing/2014/main" id="{CB8E60AA-98EB-54F3-C6B9-EF58F6D729CA}"/>
+              </a:ext>
+            </a:extLst>
+          </p:cNvPr>
+          <p:cNvSpPr txBox="1"/>
+          <p:nvPr/>
+        </p:nvSpPr>
+        <p:spPr>
+          <a:xfrm>
+            <a:off x="4361935" y="543697"/>
+            <a:ext cx="3783408" cy="369332"/>
+          </a:xfrm>
+          <a:prstGeom prst="rect">
+            <a:avLst/>
+          </a:prstGeom>
+          <a:noFill/>
+        </p:spPr>
+        <p:txBody>
+          <a:bodyPr wrap="none" rtlCol="0">
+            <a:spAutoFit/>
+          </a:bodyPr>
+          <a:lstStyle/>
+          <a:p>
+            <a:r>
+              <a:rPr kumimoji="1" lang="en-US" altLang="zh-CN" dirty="0"/>
+              <a:t>Network</a:t>
+            </a:r>
+            <a:r>
+              <a:rPr kumimoji="1" lang="zh-CN" altLang="en-US" dirty="0"/>
+              <a:t> </a:t>
+            </a:r>
+            <a:r>
+              <a:rPr kumimoji="1" lang="en-US" altLang="zh-CN" dirty="0"/>
+              <a:t>Diagram:</a:t>
+            </a:r>
+            <a:r>
+              <a:rPr kumimoji="1" lang="zh-CN" altLang="en-US" dirty="0"/>
+              <a:t> 性能与资源消耗</a:t>
+            </a:r>
+          </a:p>
+        </p:txBody>
+      </p:sp>
+      <p:sp>
+        <p:nvSpPr>
+          <p:cNvPr id="5" name="文本框 4">
+            <a:extLst>
+              <a:ext uri="{FF2B5EF4-FFF2-40B4-BE49-F238E27FC236}">
+                <a16:creationId xmlns:a16="http://schemas.microsoft.com/office/drawing/2014/main" id="{6081BDE6-8D65-4FC0-8F11-67D07DE4EE73}"/>
+              </a:ext>
+            </a:extLst>
+          </p:cNvPr>
+          <p:cNvSpPr txBox="1"/>
+          <p:nvPr/>
+        </p:nvSpPr>
+        <p:spPr>
+          <a:xfrm>
+            <a:off x="597243" y="1066800"/>
+            <a:ext cx="6845144" cy="1477328"/>
+          </a:xfrm>
+          <a:prstGeom prst="rect">
+            <a:avLst/>
+          </a:prstGeom>
+          <a:noFill/>
+        </p:spPr>
+        <p:txBody>
+          <a:bodyPr wrap="none" rtlCol="0">
+            <a:spAutoFit/>
+          </a:bodyPr>
+          <a:lstStyle/>
+          <a:p>
+            <a:r>
+              <a:rPr kumimoji="1" lang="zh-CN" altLang="en-US" dirty="0"/>
+              <a:t>功能</a:t>
+            </a:r>
+            <a:endParaRPr kumimoji="1" lang="en-US" altLang="zh-CN" dirty="0"/>
+          </a:p>
+          <a:p>
+            <a:pPr marL="342900" indent="-342900">
+              <a:buFont typeface="+mj-lt"/>
+              <a:buAutoNum type="arabicPeriod"/>
+            </a:pPr>
+            <a:r>
+              <a:rPr kumimoji="1" lang="zh-CN" altLang="en-US" dirty="0"/>
+              <a:t>显示两阶段铸造（</a:t>
+            </a:r>
+            <a:r>
+              <a:rPr kumimoji="1" lang="en-US" altLang="zh-CN" dirty="0"/>
+              <a:t>chain</a:t>
+            </a:r>
+            <a:r>
+              <a:rPr kumimoji="1" lang="zh-CN" altLang="en-US" dirty="0"/>
+              <a:t>）</a:t>
+            </a:r>
+            <a:endParaRPr kumimoji="1" lang="en-US" altLang="zh-CN" dirty="0"/>
+          </a:p>
+          <a:p>
+            <a:pPr marL="800100" lvl="1" indent="-342900">
+              <a:buFont typeface="+mj-lt"/>
+              <a:buAutoNum type="arabicPeriod"/>
+            </a:pPr>
+            <a:r>
+              <a:rPr kumimoji="1" lang="zh-CN" altLang="en-US" dirty="0"/>
+              <a:t>链：</a:t>
+            </a:r>
+            <a:r>
+              <a:rPr kumimoji="1" lang="en-US" altLang="zh-CN" dirty="0"/>
+              <a:t>block</a:t>
+            </a:r>
+            <a:r>
+              <a:rPr kumimoji="1" lang="zh-CN" altLang="en-US" dirty="0"/>
+              <a:t>（收集者、见证者、通知者</a:t>
+            </a:r>
+            <a:r>
+              <a:rPr kumimoji="1" lang="en-US" altLang="zh-CN" dirty="0"/>
+              <a:t>/</a:t>
+            </a:r>
+            <a:r>
+              <a:rPr kumimoji="1" lang="zh-CN" altLang="en-US" dirty="0"/>
+              <a:t>采纳者数量）、</a:t>
+            </a:r>
+            <a:r>
+              <a:rPr kumimoji="1" lang="en-US" altLang="zh-CN" dirty="0"/>
+              <a:t>fork</a:t>
+            </a:r>
+          </a:p>
+          <a:p>
+            <a:pPr marL="800100" lvl="1" indent="-342900">
+              <a:buFont typeface="+mj-lt"/>
+              <a:buAutoNum type="arabicPeriod"/>
+            </a:pPr>
+            <a:r>
+              <a:rPr kumimoji="1" lang="zh-CN" altLang="en-US" dirty="0"/>
+              <a:t>链的变化（</a:t>
+            </a:r>
+            <a:r>
+              <a:rPr kumimoji="1" lang="en-US" altLang="zh-CN" dirty="0"/>
+              <a:t>fork</a:t>
+            </a:r>
+            <a:r>
+              <a:rPr kumimoji="1" lang="zh-CN" altLang="en-US" dirty="0"/>
+              <a:t>，</a:t>
+            </a:r>
+            <a:r>
+              <a:rPr kumimoji="1" lang="en-US" altLang="zh-CN" dirty="0" err="1"/>
+              <a:t>changeFork</a:t>
+            </a:r>
+            <a:r>
+              <a:rPr kumimoji="1" lang="zh-CN" altLang="en-US" dirty="0"/>
+              <a:t>）</a:t>
+            </a:r>
+            <a:endParaRPr kumimoji="1" lang="en-US" altLang="zh-CN" dirty="0"/>
+          </a:p>
+          <a:p>
+            <a:pPr marL="800100" lvl="1" indent="-342900">
+              <a:buFont typeface="+mj-lt"/>
+              <a:buAutoNum type="arabicPeriod"/>
+            </a:pPr>
+            <a:r>
+              <a:rPr kumimoji="1" lang="en-US" altLang="zh-CN" dirty="0"/>
+              <a:t>block</a:t>
+            </a:r>
+            <a:r>
+              <a:rPr kumimoji="1" lang="zh-CN" altLang="en-US" dirty="0"/>
+              <a:t>浏览器：浏览</a:t>
+            </a:r>
+            <a:r>
+              <a:rPr kumimoji="1" lang="en-US" altLang="zh-CN" dirty="0"/>
+              <a:t>block</a:t>
+            </a:r>
+            <a:r>
+              <a:rPr kumimoji="1" lang="zh-CN" altLang="en-US" dirty="0"/>
+              <a:t>详情</a:t>
+            </a:r>
+          </a:p>
+        </p:txBody>
+      </p:sp>
+    </p:spTree>
+    <p:extLst>
+      <p:ext uri="{BB962C8B-B14F-4D97-AF65-F5344CB8AC3E}">
+        <p14:creationId xmlns:p14="http://schemas.microsoft.com/office/powerpoint/2010/main" val="2069920931"/>
+      </p:ext>
+    </p:extLst>
+  </p:cSld>
+  <p:clrMapOvr>
+    <a:masterClrMapping/>
+  </p:clrMapOvr>
+</p:sld>
+</file>
+
 <file path=ppt/theme/theme1.xml><?xml version="1.0" encoding="utf-8"?>
 <a:theme xmlns:a="http://schemas.openxmlformats.org/drawingml/2006/main" name="Office 主题​​">
   <a:themeElements>

</xml_diff>

<commit_message>
#8 add swarm control simulator
</commit_message>
<xml_diff>
--- a/design/designs.pptx
+++ b/design/designs.pptx
@@ -9,10 +9,11 @@
     <p:sldId id="1346" r:id="rId3"/>
     <p:sldId id="1353" r:id="rId4"/>
     <p:sldId id="257" r:id="rId5"/>
-    <p:sldId id="1349" r:id="rId6"/>
-    <p:sldId id="1351" r:id="rId7"/>
-    <p:sldId id="258" r:id="rId8"/>
-    <p:sldId id="259" r:id="rId9"/>
+    <p:sldId id="1354" r:id="rId6"/>
+    <p:sldId id="1349" r:id="rId7"/>
+    <p:sldId id="1351" r:id="rId8"/>
+    <p:sldId id="258" r:id="rId9"/>
+    <p:sldId id="259" r:id="rId10"/>
   </p:sldIdLst>
   <p:sldSz cx="12192000" cy="6858000"/>
   <p:notesSz cx="6858000" cy="9144000"/>
@@ -266,7 +267,7 @@
           <a:p>
             <a:fld id="{C5457D4C-3901-1C45-A529-D016DF44E2F2}" type="datetimeFigureOut">
               <a:rPr kumimoji="1" lang="zh-CN" altLang="en-US" smtClean="0"/>
-              <a:t>2022/9/5</a:t>
+              <a:t>2022/9/6</a:t>
             </a:fld>
             <a:endParaRPr kumimoji="1" lang="zh-CN" altLang="en-US"/>
           </a:p>
@@ -464,7 +465,7 @@
           <a:p>
             <a:fld id="{C5457D4C-3901-1C45-A529-D016DF44E2F2}" type="datetimeFigureOut">
               <a:rPr kumimoji="1" lang="zh-CN" altLang="en-US" smtClean="0"/>
-              <a:t>2022/9/5</a:t>
+              <a:t>2022/9/6</a:t>
             </a:fld>
             <a:endParaRPr kumimoji="1" lang="zh-CN" altLang="en-US"/>
           </a:p>
@@ -672,7 +673,7 @@
           <a:p>
             <a:fld id="{C5457D4C-3901-1C45-A529-D016DF44E2F2}" type="datetimeFigureOut">
               <a:rPr kumimoji="1" lang="zh-CN" altLang="en-US" smtClean="0"/>
-              <a:t>2022/9/5</a:t>
+              <a:t>2022/9/6</a:t>
             </a:fld>
             <a:endParaRPr kumimoji="1" lang="zh-CN" altLang="en-US"/>
           </a:p>
@@ -870,7 +871,7 @@
           <a:p>
             <a:fld id="{C5457D4C-3901-1C45-A529-D016DF44E2F2}" type="datetimeFigureOut">
               <a:rPr kumimoji="1" lang="zh-CN" altLang="en-US" smtClean="0"/>
-              <a:t>2022/9/5</a:t>
+              <a:t>2022/9/6</a:t>
             </a:fld>
             <a:endParaRPr kumimoji="1" lang="zh-CN" altLang="en-US"/>
           </a:p>
@@ -1145,7 +1146,7 @@
           <a:p>
             <a:fld id="{C5457D4C-3901-1C45-A529-D016DF44E2F2}" type="datetimeFigureOut">
               <a:rPr kumimoji="1" lang="zh-CN" altLang="en-US" smtClean="0"/>
-              <a:t>2022/9/5</a:t>
+              <a:t>2022/9/6</a:t>
             </a:fld>
             <a:endParaRPr kumimoji="1" lang="zh-CN" altLang="en-US"/>
           </a:p>
@@ -1410,7 +1411,7 @@
           <a:p>
             <a:fld id="{C5457D4C-3901-1C45-A529-D016DF44E2F2}" type="datetimeFigureOut">
               <a:rPr kumimoji="1" lang="zh-CN" altLang="en-US" smtClean="0"/>
-              <a:t>2022/9/5</a:t>
+              <a:t>2022/9/6</a:t>
             </a:fld>
             <a:endParaRPr kumimoji="1" lang="zh-CN" altLang="en-US"/>
           </a:p>
@@ -1822,7 +1823,7 @@
           <a:p>
             <a:fld id="{C5457D4C-3901-1C45-A529-D016DF44E2F2}" type="datetimeFigureOut">
               <a:rPr kumimoji="1" lang="zh-CN" altLang="en-US" smtClean="0"/>
-              <a:t>2022/9/5</a:t>
+              <a:t>2022/9/6</a:t>
             </a:fld>
             <a:endParaRPr kumimoji="1" lang="zh-CN" altLang="en-US"/>
           </a:p>
@@ -1963,7 +1964,7 @@
           <a:p>
             <a:fld id="{C5457D4C-3901-1C45-A529-D016DF44E2F2}" type="datetimeFigureOut">
               <a:rPr kumimoji="1" lang="zh-CN" altLang="en-US" smtClean="0"/>
-              <a:t>2022/9/5</a:t>
+              <a:t>2022/9/6</a:t>
             </a:fld>
             <a:endParaRPr kumimoji="1" lang="zh-CN" altLang="en-US"/>
           </a:p>
@@ -2076,7 +2077,7 @@
           <a:p>
             <a:fld id="{C5457D4C-3901-1C45-A529-D016DF44E2F2}" type="datetimeFigureOut">
               <a:rPr kumimoji="1" lang="zh-CN" altLang="en-US" smtClean="0"/>
-              <a:t>2022/9/5</a:t>
+              <a:t>2022/9/6</a:t>
             </a:fld>
             <a:endParaRPr kumimoji="1" lang="zh-CN" altLang="en-US"/>
           </a:p>
@@ -2387,7 +2388,7 @@
           <a:p>
             <a:fld id="{C5457D4C-3901-1C45-A529-D016DF44E2F2}" type="datetimeFigureOut">
               <a:rPr kumimoji="1" lang="zh-CN" altLang="en-US" smtClean="0"/>
-              <a:t>2022/9/5</a:t>
+              <a:t>2022/9/6</a:t>
             </a:fld>
             <a:endParaRPr kumimoji="1" lang="zh-CN" altLang="en-US"/>
           </a:p>
@@ -2675,7 +2676,7 @@
           <a:p>
             <a:fld id="{C5457D4C-3901-1C45-A529-D016DF44E2F2}" type="datetimeFigureOut">
               <a:rPr kumimoji="1" lang="zh-CN" altLang="en-US" smtClean="0"/>
-              <a:t>2022/9/5</a:t>
+              <a:t>2022/9/6</a:t>
             </a:fld>
             <a:endParaRPr kumimoji="1" lang="zh-CN" altLang="en-US"/>
           </a:p>
@@ -2916,7 +2917,7 @@
           <a:p>
             <a:fld id="{C5457D4C-3901-1C45-A529-D016DF44E2F2}" type="datetimeFigureOut">
               <a:rPr kumimoji="1" lang="zh-CN" altLang="en-US" smtClean="0"/>
-              <a:t>2022/9/5</a:t>
+              <a:t>2022/9/6</a:t>
             </a:fld>
             <a:endParaRPr kumimoji="1" lang="zh-CN" altLang="en-US"/>
           </a:p>
@@ -6355,6 +6356,711 @@
       </p:grpSpPr>
       <p:grpSp>
         <p:nvGrpSpPr>
+          <p:cNvPr id="27" name="组合 26">
+            <a:extLst>
+              <a:ext uri="{FF2B5EF4-FFF2-40B4-BE49-F238E27FC236}">
+                <a16:creationId xmlns:a16="http://schemas.microsoft.com/office/drawing/2014/main" id="{07D654B0-6834-ABF6-60D0-898F1559394C}"/>
+              </a:ext>
+            </a:extLst>
+          </p:cNvPr>
+          <p:cNvGrpSpPr/>
+          <p:nvPr/>
+        </p:nvGrpSpPr>
+        <p:grpSpPr>
+          <a:xfrm>
+            <a:off x="3410239" y="146923"/>
+            <a:ext cx="6280515" cy="6564153"/>
+            <a:chOff x="2608961" y="119451"/>
+            <a:chExt cx="6280515" cy="6564153"/>
+          </a:xfrm>
+        </p:grpSpPr>
+        <p:sp>
+          <p:nvSpPr>
+            <p:cNvPr id="4" name="矩形 3">
+              <a:extLst>
+                <a:ext uri="{FF2B5EF4-FFF2-40B4-BE49-F238E27FC236}">
+                  <a16:creationId xmlns:a16="http://schemas.microsoft.com/office/drawing/2014/main" id="{5D571C63-C632-AC91-B9AE-602A5D85BCEB}"/>
+                </a:ext>
+              </a:extLst>
+            </p:cNvPr>
+            <p:cNvSpPr/>
+            <p:nvPr/>
+          </p:nvSpPr>
+          <p:spPr>
+            <a:xfrm>
+              <a:off x="2608961" y="119451"/>
+              <a:ext cx="6280515" cy="6564153"/>
+            </a:xfrm>
+            <a:prstGeom prst="rect">
+              <a:avLst/>
+            </a:prstGeom>
+            <a:solidFill>
+              <a:schemeClr val="bg1">
+                <a:lumMod val="85000"/>
+              </a:schemeClr>
+            </a:solidFill>
+          </p:spPr>
+          <p:style>
+            <a:lnRef idx="1">
+              <a:schemeClr val="accent3"/>
+            </a:lnRef>
+            <a:fillRef idx="2">
+              <a:schemeClr val="accent3"/>
+            </a:fillRef>
+            <a:effectRef idx="1">
+              <a:schemeClr val="accent3"/>
+            </a:effectRef>
+            <a:fontRef idx="minor">
+              <a:schemeClr val="dk1"/>
+            </a:fontRef>
+          </p:style>
+          <p:txBody>
+            <a:bodyPr rtlCol="0" anchor="ctr"/>
+            <a:lstStyle/>
+            <a:p>
+              <a:pPr algn="ctr"/>
+              <a:endParaRPr kumimoji="1" lang="zh-CN" altLang="en-US" dirty="0"/>
+            </a:p>
+          </p:txBody>
+        </p:sp>
+        <p:sp>
+          <p:nvSpPr>
+            <p:cNvPr id="5" name="文本框 4">
+              <a:extLst>
+                <a:ext uri="{FF2B5EF4-FFF2-40B4-BE49-F238E27FC236}">
+                  <a16:creationId xmlns:a16="http://schemas.microsoft.com/office/drawing/2014/main" id="{562EDCFE-FE97-DDD3-EF28-A124E05D5642}"/>
+                </a:ext>
+              </a:extLst>
+            </p:cNvPr>
+            <p:cNvSpPr txBox="1"/>
+            <p:nvPr/>
+          </p:nvSpPr>
+          <p:spPr>
+            <a:xfrm>
+              <a:off x="2766587" y="255477"/>
+              <a:ext cx="946243" cy="321460"/>
+            </a:xfrm>
+            <a:prstGeom prst="rect">
+              <a:avLst/>
+            </a:prstGeom>
+            <a:noFill/>
+          </p:spPr>
+          <p:txBody>
+            <a:bodyPr wrap="none" rtlCol="0">
+              <a:spAutoFit/>
+            </a:bodyPr>
+            <a:lstStyle/>
+            <a:p>
+              <a:r>
+                <a:rPr kumimoji="1" lang="en-US" altLang="zh-CN" b="1" dirty="0"/>
+                <a:t>Network</a:t>
+              </a:r>
+              <a:endParaRPr kumimoji="1" lang="zh-CN" altLang="en-US" b="1" dirty="0"/>
+            </a:p>
+          </p:txBody>
+        </p:sp>
+        <p:sp>
+          <p:nvSpPr>
+            <p:cNvPr id="6" name="文本框 5">
+              <a:extLst>
+                <a:ext uri="{FF2B5EF4-FFF2-40B4-BE49-F238E27FC236}">
+                  <a16:creationId xmlns:a16="http://schemas.microsoft.com/office/drawing/2014/main" id="{1CDD9AF0-E997-ECD1-172A-AD368F7830EE}"/>
+                </a:ext>
+              </a:extLst>
+            </p:cNvPr>
+            <p:cNvSpPr txBox="1"/>
+            <p:nvPr/>
+          </p:nvSpPr>
+          <p:spPr>
+            <a:xfrm>
+              <a:off x="2956906" y="619182"/>
+              <a:ext cx="783344" cy="321460"/>
+            </a:xfrm>
+            <a:prstGeom prst="rect">
+              <a:avLst/>
+            </a:prstGeom>
+            <a:noFill/>
+          </p:spPr>
+          <p:txBody>
+            <a:bodyPr wrap="square" rtlCol="0">
+              <a:spAutoFit/>
+            </a:bodyPr>
+            <a:lstStyle/>
+            <a:p>
+              <a:pPr algn="r"/>
+              <a:r>
+                <a:rPr kumimoji="1" lang="en-US" altLang="zh-CN" dirty="0"/>
+                <a:t>Type</a:t>
+              </a:r>
+              <a:endParaRPr kumimoji="1" lang="zh-CN" altLang="en-US" dirty="0"/>
+            </a:p>
+          </p:txBody>
+        </p:sp>
+        <p:pic>
+          <p:nvPicPr>
+            <p:cNvPr id="8" name="图片 7">
+              <a:extLst>
+                <a:ext uri="{FF2B5EF4-FFF2-40B4-BE49-F238E27FC236}">
+                  <a16:creationId xmlns:a16="http://schemas.microsoft.com/office/drawing/2014/main" id="{0D547F61-0015-31E7-97FB-2213A9852D68}"/>
+                </a:ext>
+              </a:extLst>
+            </p:cNvPr>
+            <p:cNvPicPr>
+              <a:picLocks noChangeAspect="1"/>
+            </p:cNvPicPr>
+            <p:nvPr/>
+          </p:nvPicPr>
+          <p:blipFill>
+            <a:blip r:embed="rId2"/>
+            <a:stretch>
+              <a:fillRect/>
+            </a:stretch>
+          </p:blipFill>
+          <p:spPr>
+            <a:xfrm>
+              <a:off x="3860175" y="619182"/>
+              <a:ext cx="2509226" cy="375831"/>
+            </a:xfrm>
+            <a:prstGeom prst="rect">
+              <a:avLst/>
+            </a:prstGeom>
+          </p:spPr>
+        </p:pic>
+        <p:sp>
+          <p:nvSpPr>
+            <p:cNvPr id="9" name="文本框 8">
+              <a:extLst>
+                <a:ext uri="{FF2B5EF4-FFF2-40B4-BE49-F238E27FC236}">
+                  <a16:creationId xmlns:a16="http://schemas.microsoft.com/office/drawing/2014/main" id="{63CF9949-19F4-94B3-950D-7E6DA6B93440}"/>
+                </a:ext>
+              </a:extLst>
+            </p:cNvPr>
+            <p:cNvSpPr txBox="1"/>
+            <p:nvPr/>
+          </p:nvSpPr>
+          <p:spPr>
+            <a:xfrm>
+              <a:off x="2956906" y="1054609"/>
+              <a:ext cx="783344" cy="321460"/>
+            </a:xfrm>
+            <a:prstGeom prst="rect">
+              <a:avLst/>
+            </a:prstGeom>
+            <a:noFill/>
+          </p:spPr>
+          <p:txBody>
+            <a:bodyPr wrap="square" rtlCol="0">
+              <a:spAutoFit/>
+            </a:bodyPr>
+            <a:lstStyle/>
+            <a:p>
+              <a:pPr algn="r"/>
+              <a:r>
+                <a:rPr kumimoji="1" lang="en-US" altLang="zh-CN" dirty="0"/>
+                <a:t>From</a:t>
+              </a:r>
+              <a:endParaRPr kumimoji="1" lang="zh-CN" altLang="en-US" dirty="0"/>
+            </a:p>
+          </p:txBody>
+        </p:sp>
+        <p:sp>
+          <p:nvSpPr>
+            <p:cNvPr id="10" name="文本框 5">
+              <a:extLst>
+                <a:ext uri="{FF2B5EF4-FFF2-40B4-BE49-F238E27FC236}">
+                  <a16:creationId xmlns:a16="http://schemas.microsoft.com/office/drawing/2014/main" id="{1CDD9AF0-E997-ECD1-172A-AD368F7830EE}"/>
+                </a:ext>
+              </a:extLst>
+            </p:cNvPr>
+            <p:cNvSpPr txBox="1"/>
+            <p:nvPr/>
+          </p:nvSpPr>
+          <p:spPr>
+            <a:xfrm>
+              <a:off x="2956906" y="1490035"/>
+              <a:ext cx="783344" cy="321460"/>
+            </a:xfrm>
+            <a:prstGeom prst="rect">
+              <a:avLst/>
+            </a:prstGeom>
+            <a:noFill/>
+          </p:spPr>
+          <p:txBody>
+            <a:bodyPr wrap="square" rtlCol="0">
+              <a:spAutoFit/>
+            </a:bodyPr>
+            <a:lstStyle>
+              <a:defPPr>
+                <a:defRPr lang="zh-CN"/>
+              </a:defPPr>
+              <a:lvl1pPr marL="0" algn="l" defTabSz="914400" rtl="0" eaLnBrk="1" latinLnBrk="0" hangingPunct="1">
+                <a:defRPr sz="1800" kern="1200">
+                  <a:solidFill>
+                    <a:schemeClr val="tx1"/>
+                  </a:solidFill>
+                  <a:latin typeface="+mn-lt"/>
+                  <a:ea typeface="+mn-ea"/>
+                  <a:cs typeface="+mn-cs"/>
+                </a:defRPr>
+              </a:lvl1pPr>
+              <a:lvl2pPr marL="457200" algn="l" defTabSz="914400" rtl="0" eaLnBrk="1" latinLnBrk="0" hangingPunct="1">
+                <a:defRPr sz="1800" kern="1200">
+                  <a:solidFill>
+                    <a:schemeClr val="tx1"/>
+                  </a:solidFill>
+                  <a:latin typeface="+mn-lt"/>
+                  <a:ea typeface="+mn-ea"/>
+                  <a:cs typeface="+mn-cs"/>
+                </a:defRPr>
+              </a:lvl2pPr>
+              <a:lvl3pPr marL="914400" algn="l" defTabSz="914400" rtl="0" eaLnBrk="1" latinLnBrk="0" hangingPunct="1">
+                <a:defRPr sz="1800" kern="1200">
+                  <a:solidFill>
+                    <a:schemeClr val="tx1"/>
+                  </a:solidFill>
+                  <a:latin typeface="+mn-lt"/>
+                  <a:ea typeface="+mn-ea"/>
+                  <a:cs typeface="+mn-cs"/>
+                </a:defRPr>
+              </a:lvl3pPr>
+              <a:lvl4pPr marL="1371600" algn="l" defTabSz="914400" rtl="0" eaLnBrk="1" latinLnBrk="0" hangingPunct="1">
+                <a:defRPr sz="1800" kern="1200">
+                  <a:solidFill>
+                    <a:schemeClr val="tx1"/>
+                  </a:solidFill>
+                  <a:latin typeface="+mn-lt"/>
+                  <a:ea typeface="+mn-ea"/>
+                  <a:cs typeface="+mn-cs"/>
+                </a:defRPr>
+              </a:lvl4pPr>
+              <a:lvl5pPr marL="1828800" algn="l" defTabSz="914400" rtl="0" eaLnBrk="1" latinLnBrk="0" hangingPunct="1">
+                <a:defRPr sz="1800" kern="1200">
+                  <a:solidFill>
+                    <a:schemeClr val="tx1"/>
+                  </a:solidFill>
+                  <a:latin typeface="+mn-lt"/>
+                  <a:ea typeface="+mn-ea"/>
+                  <a:cs typeface="+mn-cs"/>
+                </a:defRPr>
+              </a:lvl5pPr>
+              <a:lvl6pPr marL="2286000" algn="l" defTabSz="914400" rtl="0" eaLnBrk="1" latinLnBrk="0" hangingPunct="1">
+                <a:defRPr sz="1800" kern="1200">
+                  <a:solidFill>
+                    <a:schemeClr val="tx1"/>
+                  </a:solidFill>
+                  <a:latin typeface="+mn-lt"/>
+                  <a:ea typeface="+mn-ea"/>
+                  <a:cs typeface="+mn-cs"/>
+                </a:defRPr>
+              </a:lvl6pPr>
+              <a:lvl7pPr marL="2743200" algn="l" defTabSz="914400" rtl="0" eaLnBrk="1" latinLnBrk="0" hangingPunct="1">
+                <a:defRPr sz="1800" kern="1200">
+                  <a:solidFill>
+                    <a:schemeClr val="tx1"/>
+                  </a:solidFill>
+                  <a:latin typeface="+mn-lt"/>
+                  <a:ea typeface="+mn-ea"/>
+                  <a:cs typeface="+mn-cs"/>
+                </a:defRPr>
+              </a:lvl7pPr>
+              <a:lvl8pPr marL="3200400" algn="l" defTabSz="914400" rtl="0" eaLnBrk="1" latinLnBrk="0" hangingPunct="1">
+                <a:defRPr sz="1800" kern="1200">
+                  <a:solidFill>
+                    <a:schemeClr val="tx1"/>
+                  </a:solidFill>
+                  <a:latin typeface="+mn-lt"/>
+                  <a:ea typeface="+mn-ea"/>
+                  <a:cs typeface="+mn-cs"/>
+                </a:defRPr>
+              </a:lvl8pPr>
+              <a:lvl9pPr marL="3657600" algn="l" defTabSz="914400" rtl="0" eaLnBrk="1" latinLnBrk="0" hangingPunct="1">
+                <a:defRPr sz="1800" kern="1200">
+                  <a:solidFill>
+                    <a:schemeClr val="tx1"/>
+                  </a:solidFill>
+                  <a:latin typeface="+mn-lt"/>
+                  <a:ea typeface="+mn-ea"/>
+                  <a:cs typeface="+mn-cs"/>
+                </a:defRPr>
+              </a:lvl9pPr>
+            </a:lstStyle>
+            <a:p>
+              <a:pPr algn="r"/>
+              <a:r>
+                <a:rPr kumimoji="1" lang="en-US" altLang="zh-CN" dirty="0"/>
+                <a:t>To</a:t>
+              </a:r>
+              <a:endParaRPr kumimoji="1" lang="zh-CN" altLang="en-US" dirty="0"/>
+            </a:p>
+          </p:txBody>
+        </p:sp>
+        <p:sp>
+          <p:nvSpPr>
+            <p:cNvPr id="18" name="文本框 17">
+              <a:extLst>
+                <a:ext uri="{FF2B5EF4-FFF2-40B4-BE49-F238E27FC236}">
+                  <a16:creationId xmlns:a16="http://schemas.microsoft.com/office/drawing/2014/main" id="{04A4C8B1-E13C-60FF-C59E-07B195A63924}"/>
+                </a:ext>
+              </a:extLst>
+            </p:cNvPr>
+            <p:cNvSpPr txBox="1"/>
+            <p:nvPr/>
+          </p:nvSpPr>
+          <p:spPr>
+            <a:xfrm>
+              <a:off x="2956906" y="4191503"/>
+              <a:ext cx="783344" cy="321460"/>
+            </a:xfrm>
+            <a:prstGeom prst="rect">
+              <a:avLst/>
+            </a:prstGeom>
+            <a:noFill/>
+          </p:spPr>
+          <p:txBody>
+            <a:bodyPr wrap="square" rtlCol="0">
+              <a:spAutoFit/>
+            </a:bodyPr>
+            <a:lstStyle/>
+            <a:p>
+              <a:pPr algn="r"/>
+              <a:r>
+                <a:rPr kumimoji="1" lang="en-US" altLang="zh-CN" dirty="0"/>
+                <a:t>Verify</a:t>
+              </a:r>
+              <a:endParaRPr kumimoji="1" lang="zh-CN" altLang="en-US" dirty="0"/>
+            </a:p>
+          </p:txBody>
+        </p:sp>
+        <p:pic>
+          <p:nvPicPr>
+            <p:cNvPr id="19" name="图片 18">
+              <a:extLst>
+                <a:ext uri="{FF2B5EF4-FFF2-40B4-BE49-F238E27FC236}">
+                  <a16:creationId xmlns:a16="http://schemas.microsoft.com/office/drawing/2014/main" id="{D76A0E25-7E83-B378-7657-666D197ACF83}"/>
+                </a:ext>
+              </a:extLst>
+            </p:cNvPr>
+            <p:cNvPicPr>
+              <a:picLocks noChangeAspect="1"/>
+            </p:cNvPicPr>
+            <p:nvPr/>
+          </p:nvPicPr>
+          <p:blipFill>
+            <a:blip r:embed="rId3"/>
+            <a:stretch>
+              <a:fillRect/>
+            </a:stretch>
+          </p:blipFill>
+          <p:spPr>
+            <a:xfrm>
+              <a:off x="3860175" y="4191503"/>
+              <a:ext cx="1503325" cy="375831"/>
+            </a:xfrm>
+            <a:prstGeom prst="rect">
+              <a:avLst/>
+            </a:prstGeom>
+          </p:spPr>
+        </p:pic>
+        <p:sp>
+          <p:nvSpPr>
+            <p:cNvPr id="20" name="文本框 19">
+              <a:extLst>
+                <a:ext uri="{FF2B5EF4-FFF2-40B4-BE49-F238E27FC236}">
+                  <a16:creationId xmlns:a16="http://schemas.microsoft.com/office/drawing/2014/main" id="{CCFE2E4A-A44E-A4BB-20A0-33EC6CC7F65E}"/>
+                </a:ext>
+              </a:extLst>
+            </p:cNvPr>
+            <p:cNvSpPr txBox="1"/>
+            <p:nvPr/>
+          </p:nvSpPr>
+          <p:spPr>
+            <a:xfrm>
+              <a:off x="2766587" y="5138868"/>
+              <a:ext cx="676964" cy="321460"/>
+            </a:xfrm>
+            <a:prstGeom prst="rect">
+              <a:avLst/>
+            </a:prstGeom>
+            <a:noFill/>
+          </p:spPr>
+          <p:txBody>
+            <a:bodyPr wrap="none" rtlCol="0">
+              <a:spAutoFit/>
+            </a:bodyPr>
+            <a:lstStyle/>
+            <a:p>
+              <a:r>
+                <a:rPr kumimoji="1" lang="en-US" altLang="zh-CN" b="1" dirty="0"/>
+                <a:t>Chain</a:t>
+              </a:r>
+              <a:endParaRPr kumimoji="1" lang="zh-CN" altLang="en-US" b="1" dirty="0"/>
+            </a:p>
+          </p:txBody>
+        </p:sp>
+        <p:pic>
+          <p:nvPicPr>
+            <p:cNvPr id="21" name="图片 20">
+              <a:extLst>
+                <a:ext uri="{FF2B5EF4-FFF2-40B4-BE49-F238E27FC236}">
+                  <a16:creationId xmlns:a16="http://schemas.microsoft.com/office/drawing/2014/main" id="{CE33A567-F51C-ED18-1CF6-2E112AD6D1EB}"/>
+                </a:ext>
+              </a:extLst>
+            </p:cNvPr>
+            <p:cNvPicPr>
+              <a:picLocks noChangeAspect="1"/>
+            </p:cNvPicPr>
+            <p:nvPr/>
+          </p:nvPicPr>
+          <p:blipFill>
+            <a:blip r:embed="rId4"/>
+            <a:stretch>
+              <a:fillRect/>
+            </a:stretch>
+          </p:blipFill>
+          <p:spPr>
+            <a:xfrm>
+              <a:off x="3860175" y="1490035"/>
+              <a:ext cx="2818734" cy="2641872"/>
+            </a:xfrm>
+            <a:prstGeom prst="rect">
+              <a:avLst/>
+            </a:prstGeom>
+          </p:spPr>
+        </p:pic>
+        <p:pic>
+          <p:nvPicPr>
+            <p:cNvPr id="11" name="图片 10">
+              <a:extLst>
+                <a:ext uri="{FF2B5EF4-FFF2-40B4-BE49-F238E27FC236}">
+                  <a16:creationId xmlns:a16="http://schemas.microsoft.com/office/drawing/2014/main" id="{25DAD8BD-106B-B87D-AFE8-E0B94062D07A}"/>
+                </a:ext>
+              </a:extLst>
+            </p:cNvPr>
+            <p:cNvPicPr>
+              <a:picLocks noChangeAspect="1"/>
+            </p:cNvPicPr>
+            <p:nvPr/>
+          </p:nvPicPr>
+          <p:blipFill>
+            <a:blip r:embed="rId5"/>
+            <a:stretch>
+              <a:fillRect/>
+            </a:stretch>
+          </p:blipFill>
+          <p:spPr>
+            <a:xfrm>
+              <a:off x="3860175" y="1054609"/>
+              <a:ext cx="3448804" cy="375831"/>
+            </a:xfrm>
+            <a:prstGeom prst="rect">
+              <a:avLst/>
+            </a:prstGeom>
+          </p:spPr>
+        </p:pic>
+        <p:sp>
+          <p:nvSpPr>
+            <p:cNvPr id="22" name="文本框 21">
+              <a:extLst>
+                <a:ext uri="{FF2B5EF4-FFF2-40B4-BE49-F238E27FC236}">
+                  <a16:creationId xmlns:a16="http://schemas.microsoft.com/office/drawing/2014/main" id="{14045DC9-84B4-4A16-9E84-A30EE489B7DF}"/>
+                </a:ext>
+              </a:extLst>
+            </p:cNvPr>
+            <p:cNvSpPr txBox="1"/>
+            <p:nvPr/>
+          </p:nvSpPr>
+          <p:spPr>
+            <a:xfrm>
+              <a:off x="2956906" y="5521975"/>
+              <a:ext cx="783344" cy="321460"/>
+            </a:xfrm>
+            <a:prstGeom prst="rect">
+              <a:avLst/>
+            </a:prstGeom>
+            <a:noFill/>
+          </p:spPr>
+          <p:txBody>
+            <a:bodyPr wrap="square" rtlCol="0">
+              <a:spAutoFit/>
+            </a:bodyPr>
+            <a:lstStyle/>
+            <a:p>
+              <a:pPr algn="r"/>
+              <a:r>
+                <a:rPr kumimoji="1" lang="en-US" altLang="zh-CN" dirty="0"/>
+                <a:t>Event</a:t>
+              </a:r>
+              <a:endParaRPr kumimoji="1" lang="zh-CN" altLang="en-US" dirty="0"/>
+            </a:p>
+          </p:txBody>
+        </p:sp>
+        <p:pic>
+          <p:nvPicPr>
+            <p:cNvPr id="23" name="图片 22">
+              <a:extLst>
+                <a:ext uri="{FF2B5EF4-FFF2-40B4-BE49-F238E27FC236}">
+                  <a16:creationId xmlns:a16="http://schemas.microsoft.com/office/drawing/2014/main" id="{F23F205E-55FD-AA20-FB31-C98D41802E7A}"/>
+                </a:ext>
+              </a:extLst>
+            </p:cNvPr>
+            <p:cNvPicPr>
+              <a:picLocks noChangeAspect="1"/>
+            </p:cNvPicPr>
+            <p:nvPr/>
+          </p:nvPicPr>
+          <p:blipFill>
+            <a:blip r:embed="rId6"/>
+            <a:stretch>
+              <a:fillRect/>
+            </a:stretch>
+          </p:blipFill>
+          <p:spPr>
+            <a:xfrm>
+              <a:off x="3860175" y="5521975"/>
+              <a:ext cx="2487118" cy="375831"/>
+            </a:xfrm>
+            <a:prstGeom prst="rect">
+              <a:avLst/>
+            </a:prstGeom>
+          </p:spPr>
+        </p:pic>
+        <p:pic>
+          <p:nvPicPr>
+            <p:cNvPr id="24" name="图片 23">
+              <a:extLst>
+                <a:ext uri="{FF2B5EF4-FFF2-40B4-BE49-F238E27FC236}">
+                  <a16:creationId xmlns:a16="http://schemas.microsoft.com/office/drawing/2014/main" id="{20F9E6B9-4279-3479-17AE-1341541AA171}"/>
+                </a:ext>
+              </a:extLst>
+            </p:cNvPr>
+            <p:cNvPicPr>
+              <a:picLocks noChangeAspect="1"/>
+            </p:cNvPicPr>
+            <p:nvPr/>
+          </p:nvPicPr>
+          <p:blipFill>
+            <a:blip r:embed="rId7"/>
+            <a:stretch>
+              <a:fillRect/>
+            </a:stretch>
+          </p:blipFill>
+          <p:spPr>
+            <a:xfrm>
+              <a:off x="3860175" y="6013964"/>
+              <a:ext cx="740609" cy="375831"/>
+            </a:xfrm>
+            <a:prstGeom prst="rect">
+              <a:avLst/>
+            </a:prstGeom>
+          </p:spPr>
+        </p:pic>
+        <p:pic>
+          <p:nvPicPr>
+            <p:cNvPr id="25" name="图片 24">
+              <a:extLst>
+                <a:ext uri="{FF2B5EF4-FFF2-40B4-BE49-F238E27FC236}">
+                  <a16:creationId xmlns:a16="http://schemas.microsoft.com/office/drawing/2014/main" id="{0856B518-6CB9-3015-71A8-213643BD23F0}"/>
+                </a:ext>
+              </a:extLst>
+            </p:cNvPr>
+            <p:cNvPicPr>
+              <a:picLocks noChangeAspect="1"/>
+            </p:cNvPicPr>
+            <p:nvPr/>
+          </p:nvPicPr>
+          <p:blipFill>
+            <a:blip r:embed="rId7"/>
+            <a:stretch>
+              <a:fillRect/>
+            </a:stretch>
+          </p:blipFill>
+          <p:spPr>
+            <a:xfrm>
+              <a:off x="3860175" y="4683492"/>
+              <a:ext cx="740609" cy="375831"/>
+            </a:xfrm>
+            <a:prstGeom prst="rect">
+              <a:avLst/>
+            </a:prstGeom>
+          </p:spPr>
+        </p:pic>
+      </p:grpSp>
+      <p:sp>
+        <p:nvSpPr>
+          <p:cNvPr id="28" name="文本框 27">
+            <a:extLst>
+              <a:ext uri="{FF2B5EF4-FFF2-40B4-BE49-F238E27FC236}">
+                <a16:creationId xmlns:a16="http://schemas.microsoft.com/office/drawing/2014/main" id="{E4E46043-4779-2996-DCA5-FB1E73566B1D}"/>
+              </a:ext>
+            </a:extLst>
+          </p:cNvPr>
+          <p:cNvSpPr txBox="1"/>
+          <p:nvPr/>
+        </p:nvSpPr>
+        <p:spPr>
+          <a:xfrm>
+            <a:off x="168305" y="152210"/>
+            <a:ext cx="2512226" cy="461665"/>
+          </a:xfrm>
+          <a:prstGeom prst="rect">
+            <a:avLst/>
+          </a:prstGeom>
+          <a:noFill/>
+        </p:spPr>
+        <p:txBody>
+          <a:bodyPr wrap="none" rtlCol="0">
+            <a:spAutoFit/>
+          </a:bodyPr>
+          <a:lstStyle/>
+          <a:p>
+            <a:r>
+              <a:rPr kumimoji="1" lang="en-US" altLang="zh-CN" sz="2400" dirty="0"/>
+              <a:t>Control</a:t>
+            </a:r>
+            <a:r>
+              <a:rPr kumimoji="1" lang="zh-CN" altLang="en-US" sz="2400" dirty="0"/>
+              <a:t> </a:t>
+            </a:r>
+            <a:r>
+              <a:rPr kumimoji="1" lang="en-US" altLang="zh-CN" sz="2400" dirty="0"/>
+              <a:t>Simulator</a:t>
+            </a:r>
+            <a:endParaRPr kumimoji="1" lang="zh-CN" altLang="en-US" sz="2400" dirty="0"/>
+          </a:p>
+        </p:txBody>
+      </p:sp>
+    </p:spTree>
+    <p:extLst>
+      <p:ext uri="{BB962C8B-B14F-4D97-AF65-F5344CB8AC3E}">
+        <p14:creationId xmlns:p14="http://schemas.microsoft.com/office/powerpoint/2010/main" val="3757417357"/>
+      </p:ext>
+    </p:extLst>
+  </p:cSld>
+  <p:clrMapOvr>
+    <a:masterClrMapping/>
+  </p:clrMapOvr>
+</p:sld>
+</file>
+
+<file path=ppt/slides/slide6.xml><?xml version="1.0" encoding="utf-8"?>
+<p:sld xmlns:a="http://schemas.openxmlformats.org/drawingml/2006/main" xmlns:r="http://schemas.openxmlformats.org/officeDocument/2006/relationships" xmlns:p="http://schemas.openxmlformats.org/presentationml/2006/main">
+  <p:cSld>
+    <p:spTree>
+      <p:nvGrpSpPr>
+        <p:cNvPr id="1" name=""/>
+        <p:cNvGrpSpPr/>
+        <p:nvPr/>
+      </p:nvGrpSpPr>
+      <p:grpSpPr>
+        <a:xfrm>
+          <a:off x="0" y="0"/>
+          <a:ext cx="0" cy="0"/>
+          <a:chOff x="0" y="0"/>
+          <a:chExt cx="0" cy="0"/>
+        </a:xfrm>
+      </p:grpSpPr>
+      <p:grpSp>
+        <p:nvGrpSpPr>
           <p:cNvPr id="7" name="组合 6">
             <a:extLst>
               <a:ext uri="{FF2B5EF4-FFF2-40B4-BE49-F238E27FC236}">
@@ -7385,7 +8091,7 @@
 </p:sld>
 </file>
 
-<file path=ppt/slides/slide6.xml><?xml version="1.0" encoding="utf-8"?>
+<file path=ppt/slides/slide7.xml><?xml version="1.0" encoding="utf-8"?>
 <p:sld xmlns:a="http://schemas.openxmlformats.org/drawingml/2006/main" xmlns:r="http://schemas.openxmlformats.org/officeDocument/2006/relationships" xmlns:p="http://schemas.openxmlformats.org/presentationml/2006/main">
   <p:cSld>
     <p:spTree>
@@ -8568,7 +9274,7 @@
 </p:sld>
 </file>
 
-<file path=ppt/slides/slide7.xml><?xml version="1.0" encoding="utf-8"?>
+<file path=ppt/slides/slide8.xml><?xml version="1.0" encoding="utf-8"?>
 <p:sld xmlns:a="http://schemas.openxmlformats.org/drawingml/2006/main" xmlns:r="http://schemas.openxmlformats.org/officeDocument/2006/relationships" xmlns:p="http://schemas.openxmlformats.org/presentationml/2006/main">
   <p:cSld>
     <p:spTree>
@@ -8779,7 +9485,7 @@
 </p:sld>
 </file>
 
-<file path=ppt/slides/slide8.xml><?xml version="1.0" encoding="utf-8"?>
+<file path=ppt/slides/slide9.xml><?xml version="1.0" encoding="utf-8"?>
 <p:sld xmlns:a="http://schemas.openxmlformats.org/drawingml/2006/main" xmlns:r="http://schemas.openxmlformats.org/officeDocument/2006/relationships" xmlns:p="http://schemas.openxmlformats.org/presentationml/2006/main">
   <p:cSld>
     <p:spTree>

</xml_diff>